<commit_message>
CWND -> CongestionWindow for CUBIC
</commit_message>
<xml_diff>
--- a/figures/Figure-sources.pptx
+++ b/figures/Figure-sources.pptx
@@ -677,7 +677,7 @@
           <a:p>
             <a:fld id="{9AD5F5E7-BF49-4F47-A424-503B82E4E0B0}" type="datetimeFigureOut">
               <a:rPr lang="en-AU" smtClean="0"/>
-              <a:t>1/12/21</a:t>
+              <a:t>2/12/21</a:t>
             </a:fld>
             <a:endParaRPr lang="en-AU"/>
           </a:p>
@@ -877,7 +877,7 @@
           <a:p>
             <a:fld id="{9AD5F5E7-BF49-4F47-A424-503B82E4E0B0}" type="datetimeFigureOut">
               <a:rPr lang="en-AU" smtClean="0"/>
-              <a:t>1/12/21</a:t>
+              <a:t>2/12/21</a:t>
             </a:fld>
             <a:endParaRPr lang="en-AU"/>
           </a:p>
@@ -1087,7 +1087,7 @@
           <a:p>
             <a:fld id="{9AD5F5E7-BF49-4F47-A424-503B82E4E0B0}" type="datetimeFigureOut">
               <a:rPr lang="en-AU" smtClean="0"/>
-              <a:t>1/12/21</a:t>
+              <a:t>2/12/21</a:t>
             </a:fld>
             <a:endParaRPr lang="en-AU"/>
           </a:p>
@@ -1287,7 +1287,7 @@
           <a:p>
             <a:fld id="{9AD5F5E7-BF49-4F47-A424-503B82E4E0B0}" type="datetimeFigureOut">
               <a:rPr lang="en-AU" smtClean="0"/>
-              <a:t>1/12/21</a:t>
+              <a:t>2/12/21</a:t>
             </a:fld>
             <a:endParaRPr lang="en-AU"/>
           </a:p>
@@ -1563,7 +1563,7 @@
           <a:p>
             <a:fld id="{9AD5F5E7-BF49-4F47-A424-503B82E4E0B0}" type="datetimeFigureOut">
               <a:rPr lang="en-AU" smtClean="0"/>
-              <a:t>1/12/21</a:t>
+              <a:t>2/12/21</a:t>
             </a:fld>
             <a:endParaRPr lang="en-AU"/>
           </a:p>
@@ -1831,7 +1831,7 @@
           <a:p>
             <a:fld id="{9AD5F5E7-BF49-4F47-A424-503B82E4E0B0}" type="datetimeFigureOut">
               <a:rPr lang="en-AU" smtClean="0"/>
-              <a:t>1/12/21</a:t>
+              <a:t>2/12/21</a:t>
             </a:fld>
             <a:endParaRPr lang="en-AU"/>
           </a:p>
@@ -2246,7 +2246,7 @@
           <a:p>
             <a:fld id="{9AD5F5E7-BF49-4F47-A424-503B82E4E0B0}" type="datetimeFigureOut">
               <a:rPr lang="en-AU" smtClean="0"/>
-              <a:t>1/12/21</a:t>
+              <a:t>2/12/21</a:t>
             </a:fld>
             <a:endParaRPr lang="en-AU"/>
           </a:p>
@@ -2388,7 +2388,7 @@
           <a:p>
             <a:fld id="{9AD5F5E7-BF49-4F47-A424-503B82E4E0B0}" type="datetimeFigureOut">
               <a:rPr lang="en-AU" smtClean="0"/>
-              <a:t>1/12/21</a:t>
+              <a:t>2/12/21</a:t>
             </a:fld>
             <a:endParaRPr lang="en-AU"/>
           </a:p>
@@ -2501,7 +2501,7 @@
           <a:p>
             <a:fld id="{9AD5F5E7-BF49-4F47-A424-503B82E4E0B0}" type="datetimeFigureOut">
               <a:rPr lang="en-AU" smtClean="0"/>
-              <a:t>1/12/21</a:t>
+              <a:t>2/12/21</a:t>
             </a:fld>
             <a:endParaRPr lang="en-AU"/>
           </a:p>
@@ -2814,7 +2814,7 @@
           <a:p>
             <a:fld id="{9AD5F5E7-BF49-4F47-A424-503B82E4E0B0}" type="datetimeFigureOut">
               <a:rPr lang="en-AU" smtClean="0"/>
-              <a:t>1/12/21</a:t>
+              <a:t>2/12/21</a:t>
             </a:fld>
             <a:endParaRPr lang="en-AU"/>
           </a:p>
@@ -3103,7 +3103,7 @@
           <a:p>
             <a:fld id="{9AD5F5E7-BF49-4F47-A424-503B82E4E0B0}" type="datetimeFigureOut">
               <a:rPr lang="en-AU" smtClean="0"/>
-              <a:t>1/12/21</a:t>
+              <a:t>2/12/21</a:t>
             </a:fld>
             <a:endParaRPr lang="en-AU"/>
           </a:p>
@@ -3346,7 +3346,7 @@
           <a:p>
             <a:fld id="{9AD5F5E7-BF49-4F47-A424-503B82E4E0B0}" type="datetimeFigureOut">
               <a:rPr lang="en-AU" smtClean="0"/>
-              <a:t>1/12/21</a:t>
+              <a:t>2/12/21</a:t>
             </a:fld>
             <a:endParaRPr lang="en-AU"/>
           </a:p>
@@ -16692,9 +16692,9 @@
           <p:nvPr/>
         </p:nvSpPr>
         <p:spPr>
-          <a:xfrm>
-            <a:off x="3126902" y="3805080"/>
-            <a:ext cx="1563249" cy="707886"/>
+          <a:xfrm rot="16200000">
+            <a:off x="603888" y="6473916"/>
+            <a:ext cx="4275529" cy="707886"/>
           </a:xfrm>
           <a:prstGeom prst="rect">
             <a:avLst/>
@@ -16709,12 +16709,16 @@
           <a:p>
             <a:pPr algn="r"/>
             <a:r>
-              <a:rPr lang="en-US" sz="4000" dirty="0">
+              <a:rPr lang="en-US" sz="4000" dirty="0" err="1">
                 <a:latin typeface="Calibri" panose="020F0502020204030204" pitchFamily="34" charset="0"/>
                 <a:cs typeface="Calibri" panose="020F0502020204030204" pitchFamily="34" charset="0"/>
               </a:rPr>
-              <a:t>CWND</a:t>
+              <a:t>CongestionWindow</a:t>
             </a:r>
+            <a:endParaRPr lang="en-US" sz="4000" dirty="0">
+              <a:latin typeface="Calibri" panose="020F0502020204030204" pitchFamily="34" charset="0"/>
+              <a:cs typeface="Calibri" panose="020F0502020204030204" pitchFamily="34" charset="0"/>
+            </a:endParaRPr>
           </a:p>
         </p:txBody>
       </p:sp>

</xml_diff>

<commit_message>
CoDel on home routers
</commit_message>
<xml_diff>
--- a/figures/Figure-sources.pptx
+++ b/figures/Figure-sources.pptx
@@ -5,7 +5,7 @@
     <p:sldMasterId id="2147483661" r:id="rId1"/>
   </p:sldMasterIdLst>
   <p:notesMasterIdLst>
-    <p:notesMasterId r:id="rId17"/>
+    <p:notesMasterId r:id="rId18"/>
   </p:notesMasterIdLst>
   <p:sldIdLst>
     <p:sldId id="257" r:id="rId2"/>
@@ -23,6 +23,7 @@
     <p:sldId id="269" r:id="rId14"/>
     <p:sldId id="270" r:id="rId15"/>
     <p:sldId id="271" r:id="rId16"/>
+    <p:sldId id="272" r:id="rId17"/>
   </p:sldIdLst>
   <p:sldSz cx="24384000" cy="13716000"/>
   <p:notesSz cx="6858000" cy="9144000"/>
@@ -24605,6 +24606,815 @@
     <p:extLst>
       <p:ext uri="{BB962C8B-B14F-4D97-AF65-F5344CB8AC3E}">
         <p14:creationId xmlns:p14="http://schemas.microsoft.com/office/powerpoint/2010/main" val="2756012963"/>
+      </p:ext>
+    </p:extLst>
+  </p:cSld>
+  <p:clrMapOvr>
+    <a:masterClrMapping/>
+  </p:clrMapOvr>
+</p:sld>
+</file>
+
+<file path=ppt/slides/slide16.xml><?xml version="1.0" encoding="utf-8"?>
+<p:sld xmlns:a="http://schemas.openxmlformats.org/drawingml/2006/main" xmlns:r="http://schemas.openxmlformats.org/officeDocument/2006/relationships" xmlns:p="http://schemas.openxmlformats.org/presentationml/2006/main">
+  <p:cSld>
+    <p:spTree>
+      <p:nvGrpSpPr>
+        <p:cNvPr id="1" name=""/>
+        <p:cNvGrpSpPr/>
+        <p:nvPr/>
+      </p:nvGrpSpPr>
+      <p:grpSpPr>
+        <a:xfrm>
+          <a:off x="0" y="0"/>
+          <a:ext cx="0" cy="0"/>
+          <a:chOff x="0" y="0"/>
+          <a:chExt cx="0" cy="0"/>
+        </a:xfrm>
+      </p:grpSpPr>
+      <p:sp>
+        <p:nvSpPr>
+          <p:cNvPr id="28" name="Oval 27">
+            <a:extLst>
+              <a:ext uri="{FF2B5EF4-FFF2-40B4-BE49-F238E27FC236}">
+                <a16:creationId xmlns:a16="http://schemas.microsoft.com/office/drawing/2014/main" id="{007D0431-73B8-124E-8C1C-1D63D6E599F6}"/>
+              </a:ext>
+            </a:extLst>
+          </p:cNvPr>
+          <p:cNvSpPr/>
+          <p:nvPr/>
+        </p:nvSpPr>
+        <p:spPr>
+          <a:xfrm>
+            <a:off x="2804642" y="5842630"/>
+            <a:ext cx="2296745" cy="2247308"/>
+          </a:xfrm>
+          <a:prstGeom prst="ellipse">
+            <a:avLst/>
+          </a:prstGeom>
+          <a:solidFill>
+            <a:schemeClr val="bg1"/>
+          </a:solidFill>
+          <a:ln w="28575">
+            <a:solidFill>
+              <a:schemeClr val="tx1"/>
+            </a:solidFill>
+          </a:ln>
+          <a:effectLst>
+            <a:outerShdw blurRad="50800" dist="38100" dir="2700000" algn="tl" rotWithShape="0">
+              <a:prstClr val="black">
+                <a:alpha val="40000"/>
+              </a:prstClr>
+            </a:outerShdw>
+          </a:effectLst>
+        </p:spPr>
+        <p:style>
+          <a:lnRef idx="2">
+            <a:schemeClr val="accent1">
+              <a:shade val="50000"/>
+            </a:schemeClr>
+          </a:lnRef>
+          <a:fillRef idx="1">
+            <a:schemeClr val="accent1"/>
+          </a:fillRef>
+          <a:effectRef idx="0">
+            <a:schemeClr val="accent1"/>
+          </a:effectRef>
+          <a:fontRef idx="minor">
+            <a:schemeClr val="lt1"/>
+          </a:fontRef>
+        </p:style>
+        <p:txBody>
+          <a:bodyPr rtlCol="0" anchor="ctr"/>
+          <a:lstStyle/>
+          <a:p>
+            <a:pPr algn="ctr"/>
+            <a:r>
+              <a:rPr lang="en-US" dirty="0">
+                <a:solidFill>
+                  <a:schemeClr val="tx1"/>
+                </a:solidFill>
+              </a:rPr>
+              <a:t>Sender</a:t>
+            </a:r>
+          </a:p>
+        </p:txBody>
+      </p:sp>
+      <p:sp>
+        <p:nvSpPr>
+          <p:cNvPr id="50" name="Oval 49">
+            <a:extLst>
+              <a:ext uri="{FF2B5EF4-FFF2-40B4-BE49-F238E27FC236}">
+                <a16:creationId xmlns:a16="http://schemas.microsoft.com/office/drawing/2014/main" id="{09DEB202-0FE9-BE42-9EFF-B666D5372720}"/>
+              </a:ext>
+            </a:extLst>
+          </p:cNvPr>
+          <p:cNvSpPr/>
+          <p:nvPr/>
+        </p:nvSpPr>
+        <p:spPr>
+          <a:xfrm>
+            <a:off x="16952098" y="5842630"/>
+            <a:ext cx="2273631" cy="2247308"/>
+          </a:xfrm>
+          <a:prstGeom prst="ellipse">
+            <a:avLst/>
+          </a:prstGeom>
+          <a:solidFill>
+            <a:schemeClr val="bg1"/>
+          </a:solidFill>
+          <a:ln w="28575">
+            <a:solidFill>
+              <a:schemeClr val="tx1"/>
+            </a:solidFill>
+          </a:ln>
+          <a:effectLst>
+            <a:outerShdw blurRad="50800" dist="38100" dir="2700000" algn="tl" rotWithShape="0">
+              <a:prstClr val="black">
+                <a:alpha val="40000"/>
+              </a:prstClr>
+            </a:outerShdw>
+          </a:effectLst>
+        </p:spPr>
+        <p:style>
+          <a:lnRef idx="2">
+            <a:schemeClr val="accent1">
+              <a:shade val="50000"/>
+            </a:schemeClr>
+          </a:lnRef>
+          <a:fillRef idx="1">
+            <a:schemeClr val="accent1"/>
+          </a:fillRef>
+          <a:effectRef idx="0">
+            <a:schemeClr val="accent1"/>
+          </a:effectRef>
+          <a:fontRef idx="minor">
+            <a:schemeClr val="lt1"/>
+          </a:fontRef>
+        </p:style>
+        <p:txBody>
+          <a:bodyPr rtlCol="0" anchor="ctr"/>
+          <a:lstStyle/>
+          <a:p>
+            <a:pPr algn="ctr"/>
+            <a:r>
+              <a:rPr lang="en-US" dirty="0">
+                <a:solidFill>
+                  <a:schemeClr val="tx1"/>
+                </a:solidFill>
+              </a:rPr>
+              <a:t>Receiver</a:t>
+            </a:r>
+          </a:p>
+        </p:txBody>
+      </p:sp>
+      <p:sp>
+        <p:nvSpPr>
+          <p:cNvPr id="9" name="Cloud 8">
+            <a:extLst>
+              <a:ext uri="{FF2B5EF4-FFF2-40B4-BE49-F238E27FC236}">
+                <a16:creationId xmlns:a16="http://schemas.microsoft.com/office/drawing/2014/main" id="{16F3FE5B-1C22-F14F-AE67-6D96A513FC25}"/>
+              </a:ext>
+            </a:extLst>
+          </p:cNvPr>
+          <p:cNvSpPr/>
+          <p:nvPr/>
+        </p:nvSpPr>
+        <p:spPr>
+          <a:xfrm>
+            <a:off x="6665495" y="5029200"/>
+            <a:ext cx="5149516" cy="3874168"/>
+          </a:xfrm>
+          <a:prstGeom prst="cloud">
+            <a:avLst/>
+          </a:prstGeom>
+          <a:solidFill>
+            <a:srgbClr val="8FD1E9"/>
+          </a:solidFill>
+          <a:ln>
+            <a:solidFill>
+              <a:srgbClr val="00A6DA"/>
+            </a:solidFill>
+          </a:ln>
+          <a:effectLst>
+            <a:outerShdw blurRad="50800" dist="38100" dir="2700000" algn="tl" rotWithShape="0">
+              <a:prstClr val="black">
+                <a:alpha val="40000"/>
+              </a:prstClr>
+            </a:outerShdw>
+          </a:effectLst>
+        </p:spPr>
+        <p:style>
+          <a:lnRef idx="2">
+            <a:schemeClr val="accent1">
+              <a:shade val="50000"/>
+            </a:schemeClr>
+          </a:lnRef>
+          <a:fillRef idx="1">
+            <a:schemeClr val="accent1"/>
+          </a:fillRef>
+          <a:effectRef idx="0">
+            <a:schemeClr val="accent1"/>
+          </a:effectRef>
+          <a:fontRef idx="minor">
+            <a:schemeClr val="lt1"/>
+          </a:fontRef>
+        </p:style>
+        <p:txBody>
+          <a:bodyPr rtlCol="0" anchor="ctr"/>
+          <a:lstStyle/>
+          <a:p>
+            <a:pPr algn="ctr"/>
+            <a:r>
+              <a:rPr lang="en-US" dirty="0">
+                <a:solidFill>
+                  <a:schemeClr val="tx1"/>
+                </a:solidFill>
+              </a:rPr>
+              <a:t>Internet</a:t>
+            </a:r>
+          </a:p>
+        </p:txBody>
+      </p:sp>
+      <p:grpSp>
+        <p:nvGrpSpPr>
+          <p:cNvPr id="11" name="Group 10">
+            <a:extLst>
+              <a:ext uri="{FF2B5EF4-FFF2-40B4-BE49-F238E27FC236}">
+                <a16:creationId xmlns:a16="http://schemas.microsoft.com/office/drawing/2014/main" id="{C698B536-02A9-734C-8DCF-784A8A362781}"/>
+              </a:ext>
+            </a:extLst>
+          </p:cNvPr>
+          <p:cNvGrpSpPr/>
+          <p:nvPr/>
+        </p:nvGrpSpPr>
+        <p:grpSpPr>
+          <a:xfrm>
+            <a:off x="13379119" y="6304547"/>
+            <a:ext cx="1995055" cy="1323474"/>
+            <a:chOff x="12563155" y="6304547"/>
+            <a:chExt cx="1995055" cy="1323474"/>
+          </a:xfrm>
+        </p:grpSpPr>
+        <p:sp>
+          <p:nvSpPr>
+            <p:cNvPr id="58" name="Rectangle 57">
+              <a:extLst>
+                <a:ext uri="{FF2B5EF4-FFF2-40B4-BE49-F238E27FC236}">
+                  <a16:creationId xmlns:a16="http://schemas.microsoft.com/office/drawing/2014/main" id="{22061AF8-C913-574B-BE71-AABFD43BB0A3}"/>
+                </a:ext>
+              </a:extLst>
+            </p:cNvPr>
+            <p:cNvSpPr/>
+            <p:nvPr/>
+          </p:nvSpPr>
+          <p:spPr>
+            <a:xfrm>
+              <a:off x="12563155" y="6304547"/>
+              <a:ext cx="1995055" cy="1323474"/>
+            </a:xfrm>
+            <a:prstGeom prst="rect">
+              <a:avLst/>
+            </a:prstGeom>
+            <a:solidFill>
+              <a:srgbClr val="8FD1E9"/>
+            </a:solidFill>
+            <a:ln w="28575">
+              <a:solidFill>
+                <a:srgbClr val="00A6DA"/>
+              </a:solidFill>
+            </a:ln>
+            <a:effectLst>
+              <a:outerShdw blurRad="50800" dist="38100" dir="2700000" algn="tl" rotWithShape="0">
+                <a:prstClr val="black">
+                  <a:alpha val="40000"/>
+                </a:prstClr>
+              </a:outerShdw>
+            </a:effectLst>
+          </p:spPr>
+          <p:style>
+            <a:lnRef idx="2">
+              <a:schemeClr val="accent1">
+                <a:shade val="50000"/>
+              </a:schemeClr>
+            </a:lnRef>
+            <a:fillRef idx="1">
+              <a:schemeClr val="accent1"/>
+            </a:fillRef>
+            <a:effectRef idx="0">
+              <a:schemeClr val="accent1"/>
+            </a:effectRef>
+            <a:fontRef idx="minor">
+              <a:schemeClr val="lt1"/>
+            </a:fontRef>
+          </p:style>
+          <p:txBody>
+            <a:bodyPr rtlCol="0" anchor="t"/>
+            <a:lstStyle/>
+            <a:p>
+              <a:pPr algn="ctr"/>
+              <a:endParaRPr lang="en-US" dirty="0">
+                <a:solidFill>
+                  <a:schemeClr val="tx1"/>
+                </a:solidFill>
+              </a:endParaRPr>
+            </a:p>
+          </p:txBody>
+        </p:sp>
+        <p:sp>
+          <p:nvSpPr>
+            <p:cNvPr id="68" name="Rectangle 67">
+              <a:extLst>
+                <a:ext uri="{FF2B5EF4-FFF2-40B4-BE49-F238E27FC236}">
+                  <a16:creationId xmlns:a16="http://schemas.microsoft.com/office/drawing/2014/main" id="{90393AC2-D78E-BD4F-9FAA-B6FBDDF82F12}"/>
+                </a:ext>
+              </a:extLst>
+            </p:cNvPr>
+            <p:cNvSpPr/>
+            <p:nvPr/>
+          </p:nvSpPr>
+          <p:spPr>
+            <a:xfrm>
+              <a:off x="12682376" y="6665495"/>
+              <a:ext cx="1756611" cy="601579"/>
+            </a:xfrm>
+            <a:prstGeom prst="rect">
+              <a:avLst/>
+            </a:prstGeom>
+            <a:noFill/>
+            <a:ln w="38100">
+              <a:solidFill>
+                <a:schemeClr val="tx1"/>
+              </a:solidFill>
+            </a:ln>
+          </p:spPr>
+          <p:style>
+            <a:lnRef idx="2">
+              <a:schemeClr val="accent1">
+                <a:shade val="50000"/>
+              </a:schemeClr>
+            </a:lnRef>
+            <a:fillRef idx="1">
+              <a:schemeClr val="accent1"/>
+            </a:fillRef>
+            <a:effectRef idx="0">
+              <a:schemeClr val="accent1"/>
+            </a:effectRef>
+            <a:fontRef idx="minor">
+              <a:schemeClr val="lt1"/>
+            </a:fontRef>
+          </p:style>
+          <p:txBody>
+            <a:bodyPr rtlCol="0" anchor="ctr"/>
+            <a:lstStyle/>
+            <a:p>
+              <a:pPr algn="ctr"/>
+              <a:endParaRPr lang="en-US"/>
+            </a:p>
+          </p:txBody>
+        </p:sp>
+        <p:cxnSp>
+          <p:nvCxnSpPr>
+            <p:cNvPr id="70" name="Straight Connector 69">
+              <a:extLst>
+                <a:ext uri="{FF2B5EF4-FFF2-40B4-BE49-F238E27FC236}">
+                  <a16:creationId xmlns:a16="http://schemas.microsoft.com/office/drawing/2014/main" id="{F29A40D1-B0E2-3244-8741-0A16517F3C07}"/>
+                </a:ext>
+              </a:extLst>
+            </p:cNvPr>
+            <p:cNvCxnSpPr>
+              <a:cxnSpLocks/>
+            </p:cNvCxnSpPr>
+            <p:nvPr/>
+          </p:nvCxnSpPr>
+          <p:spPr>
+            <a:xfrm>
+              <a:off x="14174292" y="6665495"/>
+              <a:ext cx="0" cy="601579"/>
+            </a:xfrm>
+            <a:prstGeom prst="line">
+              <a:avLst/>
+            </a:prstGeom>
+            <a:ln w="38100">
+              <a:solidFill>
+                <a:schemeClr val="tx1"/>
+              </a:solidFill>
+            </a:ln>
+          </p:spPr>
+          <p:style>
+            <a:lnRef idx="1">
+              <a:schemeClr val="accent1"/>
+            </a:lnRef>
+            <a:fillRef idx="0">
+              <a:schemeClr val="accent1"/>
+            </a:fillRef>
+            <a:effectRef idx="0">
+              <a:schemeClr val="accent1"/>
+            </a:effectRef>
+            <a:fontRef idx="minor">
+              <a:schemeClr val="tx1"/>
+            </a:fontRef>
+          </p:style>
+        </p:cxnSp>
+        <p:cxnSp>
+          <p:nvCxnSpPr>
+            <p:cNvPr id="71" name="Straight Connector 70">
+              <a:extLst>
+                <a:ext uri="{FF2B5EF4-FFF2-40B4-BE49-F238E27FC236}">
+                  <a16:creationId xmlns:a16="http://schemas.microsoft.com/office/drawing/2014/main" id="{461A16E9-FB74-9C40-A1AA-FAFBDDDBEE62}"/>
+                </a:ext>
+              </a:extLst>
+            </p:cNvPr>
+            <p:cNvCxnSpPr>
+              <a:cxnSpLocks/>
+            </p:cNvCxnSpPr>
+            <p:nvPr/>
+          </p:nvCxnSpPr>
+          <p:spPr>
+            <a:xfrm>
+              <a:off x="13917621" y="6665495"/>
+              <a:ext cx="0" cy="601579"/>
+            </a:xfrm>
+            <a:prstGeom prst="line">
+              <a:avLst/>
+            </a:prstGeom>
+            <a:ln w="38100">
+              <a:solidFill>
+                <a:schemeClr val="tx1"/>
+              </a:solidFill>
+            </a:ln>
+          </p:spPr>
+          <p:style>
+            <a:lnRef idx="1">
+              <a:schemeClr val="accent1"/>
+            </a:lnRef>
+            <a:fillRef idx="0">
+              <a:schemeClr val="accent1"/>
+            </a:fillRef>
+            <a:effectRef idx="0">
+              <a:schemeClr val="accent1"/>
+            </a:effectRef>
+            <a:fontRef idx="minor">
+              <a:schemeClr val="tx1"/>
+            </a:fontRef>
+          </p:style>
+        </p:cxnSp>
+        <p:cxnSp>
+          <p:nvCxnSpPr>
+            <p:cNvPr id="73" name="Straight Connector 72">
+              <a:extLst>
+                <a:ext uri="{FF2B5EF4-FFF2-40B4-BE49-F238E27FC236}">
+                  <a16:creationId xmlns:a16="http://schemas.microsoft.com/office/drawing/2014/main" id="{2930CAA4-3B77-374D-958B-F0661279A217}"/>
+                </a:ext>
+              </a:extLst>
+            </p:cNvPr>
+            <p:cNvCxnSpPr>
+              <a:cxnSpLocks/>
+            </p:cNvCxnSpPr>
+            <p:nvPr/>
+          </p:nvCxnSpPr>
+          <p:spPr>
+            <a:xfrm>
+              <a:off x="13636886" y="6665495"/>
+              <a:ext cx="0" cy="601579"/>
+            </a:xfrm>
+            <a:prstGeom prst="line">
+              <a:avLst/>
+            </a:prstGeom>
+            <a:ln w="38100">
+              <a:solidFill>
+                <a:schemeClr val="tx1"/>
+              </a:solidFill>
+            </a:ln>
+          </p:spPr>
+          <p:style>
+            <a:lnRef idx="1">
+              <a:schemeClr val="accent1"/>
+            </a:lnRef>
+            <a:fillRef idx="0">
+              <a:schemeClr val="accent1"/>
+            </a:fillRef>
+            <a:effectRef idx="0">
+              <a:schemeClr val="accent1"/>
+            </a:effectRef>
+            <a:fontRef idx="minor">
+              <a:schemeClr val="tx1"/>
+            </a:fontRef>
+          </p:style>
+        </p:cxnSp>
+        <p:cxnSp>
+          <p:nvCxnSpPr>
+            <p:cNvPr id="74" name="Straight Connector 73">
+              <a:extLst>
+                <a:ext uri="{FF2B5EF4-FFF2-40B4-BE49-F238E27FC236}">
+                  <a16:creationId xmlns:a16="http://schemas.microsoft.com/office/drawing/2014/main" id="{6998B737-4C3A-D74F-A2B7-E2912DC69C5B}"/>
+                </a:ext>
+              </a:extLst>
+            </p:cNvPr>
+            <p:cNvCxnSpPr>
+              <a:cxnSpLocks/>
+            </p:cNvCxnSpPr>
+            <p:nvPr/>
+          </p:nvCxnSpPr>
+          <p:spPr>
+            <a:xfrm>
+              <a:off x="13364170" y="6665495"/>
+              <a:ext cx="0" cy="601579"/>
+            </a:xfrm>
+            <a:prstGeom prst="line">
+              <a:avLst/>
+            </a:prstGeom>
+            <a:ln w="38100">
+              <a:solidFill>
+                <a:schemeClr val="tx1"/>
+              </a:solidFill>
+            </a:ln>
+          </p:spPr>
+          <p:style>
+            <a:lnRef idx="1">
+              <a:schemeClr val="accent1"/>
+            </a:lnRef>
+            <a:fillRef idx="0">
+              <a:schemeClr val="accent1"/>
+            </a:fillRef>
+            <a:effectRef idx="0">
+              <a:schemeClr val="accent1"/>
+            </a:effectRef>
+            <a:fontRef idx="minor">
+              <a:schemeClr val="tx1"/>
+            </a:fontRef>
+          </p:style>
+        </p:cxnSp>
+        <p:cxnSp>
+          <p:nvCxnSpPr>
+            <p:cNvPr id="76" name="Straight Connector 75">
+              <a:extLst>
+                <a:ext uri="{FF2B5EF4-FFF2-40B4-BE49-F238E27FC236}">
+                  <a16:creationId xmlns:a16="http://schemas.microsoft.com/office/drawing/2014/main" id="{9660C7EF-60B8-6247-9DB5-DD3B19792502}"/>
+                </a:ext>
+              </a:extLst>
+            </p:cNvPr>
+            <p:cNvCxnSpPr>
+              <a:cxnSpLocks/>
+            </p:cNvCxnSpPr>
+            <p:nvPr/>
+          </p:nvCxnSpPr>
+          <p:spPr>
+            <a:xfrm>
+              <a:off x="13059373" y="6665495"/>
+              <a:ext cx="0" cy="601579"/>
+            </a:xfrm>
+            <a:prstGeom prst="line">
+              <a:avLst/>
+            </a:prstGeom>
+            <a:ln w="38100">
+              <a:solidFill>
+                <a:schemeClr val="tx1"/>
+              </a:solidFill>
+            </a:ln>
+          </p:spPr>
+          <p:style>
+            <a:lnRef idx="1">
+              <a:schemeClr val="accent1"/>
+            </a:lnRef>
+            <a:fillRef idx="0">
+              <a:schemeClr val="accent1"/>
+            </a:fillRef>
+            <a:effectRef idx="0">
+              <a:schemeClr val="accent1"/>
+            </a:effectRef>
+            <a:fontRef idx="minor">
+              <a:schemeClr val="tx1"/>
+            </a:fontRef>
+          </p:style>
+        </p:cxnSp>
+        <p:cxnSp>
+          <p:nvCxnSpPr>
+            <p:cNvPr id="77" name="Straight Connector 76">
+              <a:extLst>
+                <a:ext uri="{FF2B5EF4-FFF2-40B4-BE49-F238E27FC236}">
+                  <a16:creationId xmlns:a16="http://schemas.microsoft.com/office/drawing/2014/main" id="{E4C17DDB-6E5E-9146-B49D-CC283AA25059}"/>
+                </a:ext>
+              </a:extLst>
+            </p:cNvPr>
+            <p:cNvCxnSpPr>
+              <a:cxnSpLocks/>
+            </p:cNvCxnSpPr>
+            <p:nvPr/>
+          </p:nvCxnSpPr>
+          <p:spPr>
+            <a:xfrm>
+              <a:off x="12682386" y="6622126"/>
+              <a:ext cx="0" cy="688316"/>
+            </a:xfrm>
+            <a:prstGeom prst="line">
+              <a:avLst/>
+            </a:prstGeom>
+            <a:ln w="63500" cap="flat">
+              <a:solidFill>
+                <a:srgbClr val="8FD1E9"/>
+              </a:solidFill>
+            </a:ln>
+          </p:spPr>
+          <p:style>
+            <a:lnRef idx="1">
+              <a:schemeClr val="accent1"/>
+            </a:lnRef>
+            <a:fillRef idx="0">
+              <a:schemeClr val="accent1"/>
+            </a:fillRef>
+            <a:effectRef idx="0">
+              <a:schemeClr val="accent1"/>
+            </a:effectRef>
+            <a:fontRef idx="minor">
+              <a:schemeClr val="tx1"/>
+            </a:fontRef>
+          </p:style>
+        </p:cxnSp>
+      </p:grpSp>
+      <p:cxnSp>
+        <p:nvCxnSpPr>
+          <p:cNvPr id="83" name="Straight Arrow Connector 82">
+            <a:extLst>
+              <a:ext uri="{FF2B5EF4-FFF2-40B4-BE49-F238E27FC236}">
+                <a16:creationId xmlns:a16="http://schemas.microsoft.com/office/drawing/2014/main" id="{659BA206-EB3A-B240-BDE8-7008E74F08F3}"/>
+              </a:ext>
+            </a:extLst>
+          </p:cNvPr>
+          <p:cNvCxnSpPr>
+            <a:cxnSpLocks/>
+            <a:stCxn id="28" idx="6"/>
+            <a:endCxn id="9" idx="2"/>
+          </p:cNvCxnSpPr>
+          <p:nvPr/>
+        </p:nvCxnSpPr>
+        <p:spPr>
+          <a:xfrm>
+            <a:off x="5101387" y="6966284"/>
+            <a:ext cx="1580081" cy="0"/>
+          </a:xfrm>
+          <a:prstGeom prst="straightConnector1">
+            <a:avLst/>
+          </a:prstGeom>
+          <a:ln w="38100">
+            <a:solidFill>
+              <a:srgbClr val="00A6DA"/>
+            </a:solidFill>
+            <a:tailEnd type="triangle" w="med" len="lg"/>
+          </a:ln>
+        </p:spPr>
+        <p:style>
+          <a:lnRef idx="1">
+            <a:schemeClr val="accent1"/>
+          </a:lnRef>
+          <a:fillRef idx="0">
+            <a:schemeClr val="accent1"/>
+          </a:fillRef>
+          <a:effectRef idx="0">
+            <a:schemeClr val="accent1"/>
+          </a:effectRef>
+          <a:fontRef idx="minor">
+            <a:schemeClr val="tx1"/>
+          </a:fontRef>
+        </p:style>
+      </p:cxnSp>
+      <p:cxnSp>
+        <p:nvCxnSpPr>
+          <p:cNvPr id="84" name="Straight Arrow Connector 83">
+            <a:extLst>
+              <a:ext uri="{FF2B5EF4-FFF2-40B4-BE49-F238E27FC236}">
+                <a16:creationId xmlns:a16="http://schemas.microsoft.com/office/drawing/2014/main" id="{F743B1FA-6659-9647-BD74-8B5779EB6C42}"/>
+              </a:ext>
+            </a:extLst>
+          </p:cNvPr>
+          <p:cNvCxnSpPr>
+            <a:cxnSpLocks/>
+            <a:stCxn id="9" idx="0"/>
+            <a:endCxn id="58" idx="1"/>
+          </p:cNvCxnSpPr>
+          <p:nvPr/>
+        </p:nvCxnSpPr>
+        <p:spPr>
+          <a:xfrm>
+            <a:off x="11810720" y="6966284"/>
+            <a:ext cx="1568399" cy="0"/>
+          </a:xfrm>
+          <a:prstGeom prst="straightConnector1">
+            <a:avLst/>
+          </a:prstGeom>
+          <a:ln w="38100">
+            <a:solidFill>
+              <a:srgbClr val="00A6DA"/>
+            </a:solidFill>
+            <a:tailEnd type="triangle" w="med" len="lg"/>
+          </a:ln>
+        </p:spPr>
+        <p:style>
+          <a:lnRef idx="1">
+            <a:schemeClr val="accent1"/>
+          </a:lnRef>
+          <a:fillRef idx="0">
+            <a:schemeClr val="accent1"/>
+          </a:fillRef>
+          <a:effectRef idx="0">
+            <a:schemeClr val="accent1"/>
+          </a:effectRef>
+          <a:fontRef idx="minor">
+            <a:schemeClr val="tx1"/>
+          </a:fontRef>
+        </p:style>
+      </p:cxnSp>
+      <p:cxnSp>
+        <p:nvCxnSpPr>
+          <p:cNvPr id="85" name="Straight Arrow Connector 84">
+            <a:extLst>
+              <a:ext uri="{FF2B5EF4-FFF2-40B4-BE49-F238E27FC236}">
+                <a16:creationId xmlns:a16="http://schemas.microsoft.com/office/drawing/2014/main" id="{CAED15F6-1CB0-E748-A078-895AEE99460C}"/>
+              </a:ext>
+            </a:extLst>
+          </p:cNvPr>
+          <p:cNvCxnSpPr>
+            <a:cxnSpLocks/>
+            <a:endCxn id="50" idx="2"/>
+          </p:cNvCxnSpPr>
+          <p:nvPr/>
+        </p:nvCxnSpPr>
+        <p:spPr>
+          <a:xfrm flipV="1">
+            <a:off x="15374174" y="6966284"/>
+            <a:ext cx="1577924" cy="14498"/>
+          </a:xfrm>
+          <a:prstGeom prst="straightConnector1">
+            <a:avLst/>
+          </a:prstGeom>
+          <a:ln w="38100">
+            <a:solidFill>
+              <a:srgbClr val="00A6DA"/>
+            </a:solidFill>
+            <a:prstDash val="solid"/>
+            <a:tailEnd type="triangle" w="med" len="lg"/>
+          </a:ln>
+        </p:spPr>
+        <p:style>
+          <a:lnRef idx="1">
+            <a:schemeClr val="accent1"/>
+          </a:lnRef>
+          <a:fillRef idx="0">
+            <a:schemeClr val="accent1"/>
+          </a:fillRef>
+          <a:effectRef idx="0">
+            <a:schemeClr val="accent1"/>
+          </a:effectRef>
+          <a:fontRef idx="minor">
+            <a:schemeClr val="tx1"/>
+          </a:fontRef>
+        </p:style>
+      </p:cxnSp>
+      <p:sp>
+        <p:nvSpPr>
+          <p:cNvPr id="29" name="TextBox 28">
+            <a:extLst>
+              <a:ext uri="{FF2B5EF4-FFF2-40B4-BE49-F238E27FC236}">
+                <a16:creationId xmlns:a16="http://schemas.microsoft.com/office/drawing/2014/main" id="{B03D3838-9E35-0F48-95D0-3A37068FCD76}"/>
+              </a:ext>
+            </a:extLst>
+          </p:cNvPr>
+          <p:cNvSpPr txBox="1"/>
+          <p:nvPr/>
+        </p:nvSpPr>
+        <p:spPr>
+          <a:xfrm>
+            <a:off x="13246263" y="7633798"/>
+            <a:ext cx="2422458" cy="584775"/>
+          </a:xfrm>
+          <a:prstGeom prst="rect">
+            <a:avLst/>
+          </a:prstGeom>
+          <a:noFill/>
+        </p:spPr>
+        <p:txBody>
+          <a:bodyPr wrap="none" rtlCol="0">
+            <a:spAutoFit/>
+          </a:bodyPr>
+          <a:lstStyle/>
+          <a:p>
+            <a:r>
+              <a:rPr lang="en-US" dirty="0">
+                <a:solidFill>
+                  <a:schemeClr val="tx1"/>
+                </a:solidFill>
+                <a:latin typeface="Calibri" panose="020F0502020204030204" pitchFamily="34" charset="0"/>
+                <a:cs typeface="Calibri" panose="020F0502020204030204" pitchFamily="34" charset="0"/>
+              </a:rPr>
+              <a:t>Home Router</a:t>
+            </a:r>
+          </a:p>
+        </p:txBody>
+      </p:sp>
+    </p:spTree>
+    <p:extLst>
+      <p:ext uri="{BB962C8B-B14F-4D97-AF65-F5344CB8AC3E}">
+        <p14:creationId xmlns:p14="http://schemas.microsoft.com/office/powerpoint/2010/main" val="3523281770"/>
       </p:ext>
     </p:extLst>
   </p:cSld>

</xml_diff>

<commit_message>
edits to CoDel figure
</commit_message>
<xml_diff>
--- a/figures/Figure-sources.pptx
+++ b/figures/Figure-sources.pptx
@@ -747,7 +747,7 @@
           <a:p>
             <a:fld id="{9AD5F5E7-BF49-4F47-A424-503B82E4E0B0}" type="datetimeFigureOut">
               <a:rPr lang="en-AU" smtClean="0"/>
-              <a:t>14/2/22</a:t>
+              <a:t>16/2/2022</a:t>
             </a:fld>
             <a:endParaRPr lang="en-AU"/>
           </a:p>
@@ -947,7 +947,7 @@
           <a:p>
             <a:fld id="{9AD5F5E7-BF49-4F47-A424-503B82E4E0B0}" type="datetimeFigureOut">
               <a:rPr lang="en-AU" smtClean="0"/>
-              <a:t>14/2/22</a:t>
+              <a:t>16/2/2022</a:t>
             </a:fld>
             <a:endParaRPr lang="en-AU"/>
           </a:p>
@@ -1157,7 +1157,7 @@
           <a:p>
             <a:fld id="{9AD5F5E7-BF49-4F47-A424-503B82E4E0B0}" type="datetimeFigureOut">
               <a:rPr lang="en-AU" smtClean="0"/>
-              <a:t>14/2/22</a:t>
+              <a:t>16/2/2022</a:t>
             </a:fld>
             <a:endParaRPr lang="en-AU"/>
           </a:p>
@@ -1357,7 +1357,7 @@
           <a:p>
             <a:fld id="{9AD5F5E7-BF49-4F47-A424-503B82E4E0B0}" type="datetimeFigureOut">
               <a:rPr lang="en-AU" smtClean="0"/>
-              <a:t>14/2/22</a:t>
+              <a:t>16/2/2022</a:t>
             </a:fld>
             <a:endParaRPr lang="en-AU"/>
           </a:p>
@@ -1633,7 +1633,7 @@
           <a:p>
             <a:fld id="{9AD5F5E7-BF49-4F47-A424-503B82E4E0B0}" type="datetimeFigureOut">
               <a:rPr lang="en-AU" smtClean="0"/>
-              <a:t>14/2/22</a:t>
+              <a:t>16/2/2022</a:t>
             </a:fld>
             <a:endParaRPr lang="en-AU"/>
           </a:p>
@@ -1901,7 +1901,7 @@
           <a:p>
             <a:fld id="{9AD5F5E7-BF49-4F47-A424-503B82E4E0B0}" type="datetimeFigureOut">
               <a:rPr lang="en-AU" smtClean="0"/>
-              <a:t>14/2/22</a:t>
+              <a:t>16/2/2022</a:t>
             </a:fld>
             <a:endParaRPr lang="en-AU"/>
           </a:p>
@@ -2316,7 +2316,7 @@
           <a:p>
             <a:fld id="{9AD5F5E7-BF49-4F47-A424-503B82E4E0B0}" type="datetimeFigureOut">
               <a:rPr lang="en-AU" smtClean="0"/>
-              <a:t>14/2/22</a:t>
+              <a:t>16/2/2022</a:t>
             </a:fld>
             <a:endParaRPr lang="en-AU"/>
           </a:p>
@@ -2458,7 +2458,7 @@
           <a:p>
             <a:fld id="{9AD5F5E7-BF49-4F47-A424-503B82E4E0B0}" type="datetimeFigureOut">
               <a:rPr lang="en-AU" smtClean="0"/>
-              <a:t>14/2/22</a:t>
+              <a:t>16/2/2022</a:t>
             </a:fld>
             <a:endParaRPr lang="en-AU"/>
           </a:p>
@@ -2571,7 +2571,7 @@
           <a:p>
             <a:fld id="{9AD5F5E7-BF49-4F47-A424-503B82E4E0B0}" type="datetimeFigureOut">
               <a:rPr lang="en-AU" smtClean="0"/>
-              <a:t>14/2/22</a:t>
+              <a:t>16/2/2022</a:t>
             </a:fld>
             <a:endParaRPr lang="en-AU"/>
           </a:p>
@@ -2884,7 +2884,7 @@
           <a:p>
             <a:fld id="{9AD5F5E7-BF49-4F47-A424-503B82E4E0B0}" type="datetimeFigureOut">
               <a:rPr lang="en-AU" smtClean="0"/>
-              <a:t>14/2/22</a:t>
+              <a:t>16/2/2022</a:t>
             </a:fld>
             <a:endParaRPr lang="en-AU"/>
           </a:p>
@@ -3173,7 +3173,7 @@
           <a:p>
             <a:fld id="{9AD5F5E7-BF49-4F47-A424-503B82E4E0B0}" type="datetimeFigureOut">
               <a:rPr lang="en-AU" smtClean="0"/>
-              <a:t>14/2/22</a:t>
+              <a:t>16/2/2022</a:t>
             </a:fld>
             <a:endParaRPr lang="en-AU"/>
           </a:p>
@@ -3416,7 +3416,7 @@
           <a:p>
             <a:fld id="{9AD5F5E7-BF49-4F47-A424-503B82E4E0B0}" type="datetimeFigureOut">
               <a:rPr lang="en-AU" smtClean="0"/>
-              <a:t>14/2/22</a:t>
+              <a:t>16/2/2022</a:t>
             </a:fld>
             <a:endParaRPr lang="en-AU"/>
           </a:p>
@@ -8883,7 +8883,7 @@
         </p:nvCxnSpPr>
         <p:spPr>
           <a:xfrm flipH="1">
-            <a:off x="4702629" y="5472854"/>
+            <a:off x="4702629" y="3927110"/>
             <a:ext cx="20270" cy="2495492"/>
           </a:xfrm>
           <a:prstGeom prst="line">
@@ -8928,7 +8928,7 @@
         </p:nvCxnSpPr>
         <p:spPr>
           <a:xfrm flipH="1">
-            <a:off x="4702629" y="7960006"/>
+            <a:off x="4702629" y="6414262"/>
             <a:ext cx="7980438" cy="8340"/>
           </a:xfrm>
           <a:prstGeom prst="line">
@@ -8971,8 +8971,8 @@
         </p:nvSpPr>
         <p:spPr>
           <a:xfrm>
-            <a:off x="8119328" y="8240376"/>
-            <a:ext cx="649537" cy="369332"/>
+            <a:off x="8041583" y="6564006"/>
+            <a:ext cx="805029" cy="461665"/>
           </a:xfrm>
           <a:prstGeom prst="rect">
             <a:avLst/>
@@ -8986,7 +8986,7 @@
           <a:lstStyle/>
           <a:p>
             <a:r>
-              <a:rPr lang="en-AU" sz="1800" dirty="0">
+              <a:rPr lang="en-AU" sz="2400" dirty="0">
                 <a:latin typeface="+mn-lt"/>
                 <a:cs typeface="Microsoft Sans Serif" panose="020B0604020202020204" pitchFamily="34" charset="0"/>
               </a:rPr>
@@ -9009,8 +9009,8 @@
         </p:nvSpPr>
         <p:spPr>
           <a:xfrm rot="16200000">
-            <a:off x="3229876" y="6285887"/>
-            <a:ext cx="1510349" cy="369332"/>
+            <a:off x="3011868" y="4693977"/>
+            <a:ext cx="1946367" cy="461665"/>
           </a:xfrm>
           <a:prstGeom prst="rect">
             <a:avLst/>
@@ -9024,7 +9024,7 @@
           <a:lstStyle/>
           <a:p>
             <a:r>
-              <a:rPr lang="en-AU" sz="1800" dirty="0">
+              <a:rPr lang="en-AU" sz="2400" dirty="0">
                 <a:latin typeface="Calibri" panose="020F0502020204030204" pitchFamily="34" charset="0"/>
                 <a:cs typeface="Calibri" panose="020F0502020204030204" pitchFamily="34" charset="0"/>
               </a:rPr>
@@ -9047,7 +9047,7 @@
         </p:nvGrpSpPr>
         <p:grpSpPr>
           <a:xfrm>
-            <a:off x="4861034" y="7678857"/>
+            <a:off x="4861034" y="6133113"/>
             <a:ext cx="110362" cy="278526"/>
             <a:chOff x="4861034" y="8776136"/>
             <a:chExt cx="110362" cy="278526"/>
@@ -9130,7 +9130,7 @@
             <a:lstStyle/>
             <a:p>
               <a:pPr algn="ctr"/>
-              <a:endParaRPr lang="en-AU"/>
+              <a:endParaRPr lang="en-AU" sz="2000"/>
             </a:p>
           </p:txBody>
         </p:sp>
@@ -9211,7 +9211,7 @@
             <a:lstStyle/>
             <a:p>
               <a:pPr algn="ctr"/>
-              <a:endParaRPr lang="en-AU"/>
+              <a:endParaRPr lang="en-AU" sz="2000"/>
             </a:p>
           </p:txBody>
         </p:sp>
@@ -9230,7 +9230,7 @@
         </p:nvGrpSpPr>
         <p:grpSpPr>
           <a:xfrm>
-            <a:off x="4976649" y="7405589"/>
+            <a:off x="4976649" y="5859845"/>
             <a:ext cx="110362" cy="278526"/>
             <a:chOff x="4861034" y="8776136"/>
             <a:chExt cx="110362" cy="278526"/>
@@ -9313,7 +9313,7 @@
             <a:lstStyle/>
             <a:p>
               <a:pPr algn="ctr"/>
-              <a:endParaRPr lang="en-AU"/>
+              <a:endParaRPr lang="en-AU" sz="2000"/>
             </a:p>
           </p:txBody>
         </p:sp>
@@ -9394,7 +9394,7 @@
             <a:lstStyle/>
             <a:p>
               <a:pPr algn="ctr"/>
-              <a:endParaRPr lang="en-AU"/>
+              <a:endParaRPr lang="en-AU" sz="2000"/>
             </a:p>
           </p:txBody>
         </p:sp>
@@ -9413,7 +9413,7 @@
         </p:nvGrpSpPr>
         <p:grpSpPr>
           <a:xfrm>
-            <a:off x="5081749" y="6859056"/>
+            <a:off x="5081749" y="5313312"/>
             <a:ext cx="225977" cy="551794"/>
             <a:chOff x="4861034" y="8502868"/>
             <a:chExt cx="225977" cy="551794"/>
@@ -9516,7 +9516,7 @@
               <a:lstStyle/>
               <a:p>
                 <a:pPr algn="ctr"/>
-                <a:endParaRPr lang="en-AU"/>
+                <a:endParaRPr lang="en-AU" sz="2000"/>
               </a:p>
             </p:txBody>
           </p:sp>
@@ -9597,7 +9597,7 @@
               <a:lstStyle/>
               <a:p>
                 <a:pPr algn="ctr"/>
-                <a:endParaRPr lang="en-AU"/>
+                <a:endParaRPr lang="en-AU" sz="2000"/>
               </a:p>
             </p:txBody>
           </p:sp>
@@ -9699,7 +9699,7 @@
               <a:lstStyle/>
               <a:p>
                 <a:pPr algn="ctr"/>
-                <a:endParaRPr lang="en-AU"/>
+                <a:endParaRPr lang="en-AU" sz="2000"/>
               </a:p>
             </p:txBody>
           </p:sp>
@@ -9780,7 +9780,7 @@
               <a:lstStyle/>
               <a:p>
                 <a:pPr algn="ctr"/>
-                <a:endParaRPr lang="en-AU"/>
+                <a:endParaRPr lang="en-AU" sz="2000"/>
               </a:p>
             </p:txBody>
           </p:sp>
@@ -9800,7 +9800,7 @@
         </p:nvGrpSpPr>
         <p:grpSpPr>
           <a:xfrm>
-            <a:off x="5302464" y="6312521"/>
+            <a:off x="5302464" y="4766777"/>
             <a:ext cx="225977" cy="551794"/>
             <a:chOff x="4861034" y="8502868"/>
             <a:chExt cx="225977" cy="551794"/>
@@ -9903,7 +9903,7 @@
               <a:lstStyle/>
               <a:p>
                 <a:pPr algn="ctr"/>
-                <a:endParaRPr lang="en-AU"/>
+                <a:endParaRPr lang="en-AU" sz="2000"/>
               </a:p>
             </p:txBody>
           </p:sp>
@@ -9984,7 +9984,7 @@
               <a:lstStyle/>
               <a:p>
                 <a:pPr algn="ctr"/>
-                <a:endParaRPr lang="en-AU"/>
+                <a:endParaRPr lang="en-AU" sz="2000"/>
               </a:p>
             </p:txBody>
           </p:sp>
@@ -10086,7 +10086,7 @@
               <a:lstStyle/>
               <a:p>
                 <a:pPr algn="ctr"/>
-                <a:endParaRPr lang="en-AU"/>
+                <a:endParaRPr lang="en-AU" sz="2000"/>
               </a:p>
             </p:txBody>
           </p:sp>
@@ -10167,7 +10167,7 @@
               <a:lstStyle/>
               <a:p>
                 <a:pPr algn="ctr"/>
-                <a:endParaRPr lang="en-AU"/>
+                <a:endParaRPr lang="en-AU" sz="2000"/>
               </a:p>
             </p:txBody>
           </p:sp>
@@ -10187,7 +10187,7 @@
         </p:nvGrpSpPr>
         <p:grpSpPr>
           <a:xfrm>
-            <a:off x="5523179" y="5765986"/>
+            <a:off x="5523179" y="4220242"/>
             <a:ext cx="225977" cy="551794"/>
             <a:chOff x="4861034" y="8502868"/>
             <a:chExt cx="225977" cy="551794"/>
@@ -10290,7 +10290,7 @@
               <a:lstStyle/>
               <a:p>
                 <a:pPr algn="ctr"/>
-                <a:endParaRPr lang="en-AU"/>
+                <a:endParaRPr lang="en-AU" sz="2000"/>
               </a:p>
             </p:txBody>
           </p:sp>
@@ -10371,7 +10371,7 @@
               <a:lstStyle/>
               <a:p>
                 <a:pPr algn="ctr"/>
-                <a:endParaRPr lang="en-AU"/>
+                <a:endParaRPr lang="en-AU" sz="2000"/>
               </a:p>
             </p:txBody>
           </p:sp>
@@ -10473,7 +10473,7 @@
               <a:lstStyle/>
               <a:p>
                 <a:pPr algn="ctr"/>
-                <a:endParaRPr lang="en-AU"/>
+                <a:endParaRPr lang="en-AU" sz="2000"/>
               </a:p>
             </p:txBody>
           </p:sp>
@@ -10554,7 +10554,7 @@
               <a:lstStyle/>
               <a:p>
                 <a:pPr algn="ctr"/>
-                <a:endParaRPr lang="en-AU"/>
+                <a:endParaRPr lang="en-AU" sz="2000"/>
               </a:p>
             </p:txBody>
           </p:sp>
@@ -10574,7 +10574,7 @@
         </p:nvGrpSpPr>
         <p:grpSpPr>
           <a:xfrm>
-            <a:off x="5746823" y="5765977"/>
+            <a:off x="5746823" y="4220233"/>
             <a:ext cx="590625" cy="551795"/>
             <a:chOff x="5746823" y="6863256"/>
             <a:chExt cx="590625" cy="551795"/>
@@ -10677,7 +10677,7 @@
               <a:lstStyle/>
               <a:p>
                 <a:pPr algn="ctr"/>
-                <a:endParaRPr lang="en-AU"/>
+                <a:endParaRPr lang="en-AU" sz="2000"/>
               </a:p>
             </p:txBody>
           </p:sp>
@@ -10758,7 +10758,7 @@
               <a:lstStyle/>
               <a:p>
                 <a:pPr algn="ctr"/>
-                <a:endParaRPr lang="en-AU"/>
+                <a:endParaRPr lang="en-AU" sz="2000"/>
               </a:p>
             </p:txBody>
           </p:sp>
@@ -10860,7 +10860,7 @@
               <a:lstStyle/>
               <a:p>
                 <a:pPr algn="ctr"/>
-                <a:endParaRPr lang="en-AU"/>
+                <a:endParaRPr lang="en-AU" sz="2000"/>
               </a:p>
             </p:txBody>
           </p:sp>
@@ -10941,7 +10941,7 @@
               <a:lstStyle/>
               <a:p>
                 <a:pPr algn="ctr"/>
-                <a:endParaRPr lang="en-AU"/>
+                <a:endParaRPr lang="en-AU" sz="2000"/>
               </a:p>
             </p:txBody>
           </p:sp>
@@ -10961,7 +10961,7 @@
         </p:nvGrpSpPr>
         <p:grpSpPr>
           <a:xfrm>
-            <a:off x="8926038" y="7689825"/>
+            <a:off x="8926038" y="6144081"/>
             <a:ext cx="110362" cy="278526"/>
             <a:chOff x="4861034" y="8776136"/>
             <a:chExt cx="110362" cy="278526"/>
@@ -11044,7 +11044,7 @@
             <a:lstStyle/>
             <a:p>
               <a:pPr algn="ctr"/>
-              <a:endParaRPr lang="en-AU"/>
+              <a:endParaRPr lang="en-AU" sz="2000"/>
             </a:p>
           </p:txBody>
         </p:sp>
@@ -11125,7 +11125,7 @@
             <a:lstStyle/>
             <a:p>
               <a:pPr algn="ctr"/>
-              <a:endParaRPr lang="en-AU"/>
+              <a:endParaRPr lang="en-AU" sz="2000"/>
             </a:p>
           </p:txBody>
         </p:sp>
@@ -11144,7 +11144,7 @@
         </p:nvGrpSpPr>
         <p:grpSpPr>
           <a:xfrm>
-            <a:off x="9041653" y="7416557"/>
+            <a:off x="9041653" y="5870813"/>
             <a:ext cx="110362" cy="278526"/>
             <a:chOff x="4861034" y="8776136"/>
             <a:chExt cx="110362" cy="278526"/>
@@ -11227,7 +11227,7 @@
             <a:lstStyle/>
             <a:p>
               <a:pPr algn="ctr"/>
-              <a:endParaRPr lang="en-AU"/>
+              <a:endParaRPr lang="en-AU" sz="2000"/>
             </a:p>
           </p:txBody>
         </p:sp>
@@ -11308,7 +11308,7 @@
             <a:lstStyle/>
             <a:p>
               <a:pPr algn="ctr"/>
-              <a:endParaRPr lang="en-AU"/>
+              <a:endParaRPr lang="en-AU" sz="2000"/>
             </a:p>
           </p:txBody>
         </p:sp>
@@ -11327,7 +11327,7 @@
         </p:nvGrpSpPr>
         <p:grpSpPr>
           <a:xfrm>
-            <a:off x="9146753" y="6870024"/>
+            <a:off x="9146753" y="5324280"/>
             <a:ext cx="225977" cy="551794"/>
             <a:chOff x="4861034" y="8502868"/>
             <a:chExt cx="225977" cy="551794"/>
@@ -11430,7 +11430,7 @@
               <a:lstStyle/>
               <a:p>
                 <a:pPr algn="ctr"/>
-                <a:endParaRPr lang="en-AU"/>
+                <a:endParaRPr lang="en-AU" sz="2000"/>
               </a:p>
             </p:txBody>
           </p:sp>
@@ -11511,7 +11511,7 @@
               <a:lstStyle/>
               <a:p>
                 <a:pPr algn="ctr"/>
-                <a:endParaRPr lang="en-AU"/>
+                <a:endParaRPr lang="en-AU" sz="2000"/>
               </a:p>
             </p:txBody>
           </p:sp>
@@ -11613,7 +11613,7 @@
               <a:lstStyle/>
               <a:p>
                 <a:pPr algn="ctr"/>
-                <a:endParaRPr lang="en-AU"/>
+                <a:endParaRPr lang="en-AU" sz="2000"/>
               </a:p>
             </p:txBody>
           </p:sp>
@@ -11694,7 +11694,7 @@
               <a:lstStyle/>
               <a:p>
                 <a:pPr algn="ctr"/>
-                <a:endParaRPr lang="en-AU"/>
+                <a:endParaRPr lang="en-AU" sz="2000"/>
               </a:p>
             </p:txBody>
           </p:sp>
@@ -11714,7 +11714,7 @@
         </p:nvGrpSpPr>
         <p:grpSpPr>
           <a:xfrm>
-            <a:off x="9367468" y="6323489"/>
+            <a:off x="9367468" y="4777745"/>
             <a:ext cx="225977" cy="551794"/>
             <a:chOff x="4861034" y="8502868"/>
             <a:chExt cx="225977" cy="551794"/>
@@ -11817,7 +11817,7 @@
               <a:lstStyle/>
               <a:p>
                 <a:pPr algn="ctr"/>
-                <a:endParaRPr lang="en-AU"/>
+                <a:endParaRPr lang="en-AU" sz="2000"/>
               </a:p>
             </p:txBody>
           </p:sp>
@@ -11898,7 +11898,7 @@
               <a:lstStyle/>
               <a:p>
                 <a:pPr algn="ctr"/>
-                <a:endParaRPr lang="en-AU"/>
+                <a:endParaRPr lang="en-AU" sz="2000"/>
               </a:p>
             </p:txBody>
           </p:sp>
@@ -12000,7 +12000,7 @@
               <a:lstStyle/>
               <a:p>
                 <a:pPr algn="ctr"/>
-                <a:endParaRPr lang="en-AU"/>
+                <a:endParaRPr lang="en-AU" sz="2000"/>
               </a:p>
             </p:txBody>
           </p:sp>
@@ -12081,7 +12081,7 @@
               <a:lstStyle/>
               <a:p>
                 <a:pPr algn="ctr"/>
-                <a:endParaRPr lang="en-AU"/>
+                <a:endParaRPr lang="en-AU" sz="2000"/>
               </a:p>
             </p:txBody>
           </p:sp>
@@ -12101,7 +12101,7 @@
         </p:nvGrpSpPr>
         <p:grpSpPr>
           <a:xfrm>
-            <a:off x="9588183" y="5776954"/>
+            <a:off x="9588183" y="4231210"/>
             <a:ext cx="225977" cy="551794"/>
             <a:chOff x="4861034" y="8502868"/>
             <a:chExt cx="225977" cy="551794"/>
@@ -12204,7 +12204,7 @@
               <a:lstStyle/>
               <a:p>
                 <a:pPr algn="ctr"/>
-                <a:endParaRPr lang="en-AU"/>
+                <a:endParaRPr lang="en-AU" sz="2000"/>
               </a:p>
             </p:txBody>
           </p:sp>
@@ -12285,7 +12285,7 @@
               <a:lstStyle/>
               <a:p>
                 <a:pPr algn="ctr"/>
-                <a:endParaRPr lang="en-AU"/>
+                <a:endParaRPr lang="en-AU" sz="2000"/>
               </a:p>
             </p:txBody>
           </p:sp>
@@ -12387,7 +12387,7 @@
               <a:lstStyle/>
               <a:p>
                 <a:pPr algn="ctr"/>
-                <a:endParaRPr lang="en-AU"/>
+                <a:endParaRPr lang="en-AU" sz="2000"/>
               </a:p>
             </p:txBody>
           </p:sp>
@@ -12468,7 +12468,7 @@
               <a:lstStyle/>
               <a:p>
                 <a:pPr algn="ctr"/>
-                <a:endParaRPr lang="en-AU"/>
+                <a:endParaRPr lang="en-AU" sz="2000"/>
               </a:p>
             </p:txBody>
           </p:sp>
@@ -12488,7 +12488,7 @@
         </p:nvGrpSpPr>
         <p:grpSpPr>
           <a:xfrm>
-            <a:off x="6329444" y="6310657"/>
+            <a:off x="6329444" y="4764913"/>
             <a:ext cx="590625" cy="551795"/>
             <a:chOff x="5746823" y="6863256"/>
             <a:chExt cx="590625" cy="551795"/>
@@ -12591,7 +12591,7 @@
               <a:lstStyle/>
               <a:p>
                 <a:pPr algn="ctr"/>
-                <a:endParaRPr lang="en-AU"/>
+                <a:endParaRPr lang="en-AU" sz="2000"/>
               </a:p>
             </p:txBody>
           </p:sp>
@@ -12672,7 +12672,7 @@
               <a:lstStyle/>
               <a:p>
                 <a:pPr algn="ctr"/>
-                <a:endParaRPr lang="en-AU"/>
+                <a:endParaRPr lang="en-AU" sz="2000"/>
               </a:p>
             </p:txBody>
           </p:sp>
@@ -12774,7 +12774,7 @@
               <a:lstStyle/>
               <a:p>
                 <a:pPr algn="ctr"/>
-                <a:endParaRPr lang="en-AU"/>
+                <a:endParaRPr lang="en-AU" sz="2000"/>
               </a:p>
             </p:txBody>
           </p:sp>
@@ -12855,7 +12855,7 @@
               <a:lstStyle/>
               <a:p>
                 <a:pPr algn="ctr"/>
-                <a:endParaRPr lang="en-AU"/>
+                <a:endParaRPr lang="en-AU" sz="2000"/>
               </a:p>
             </p:txBody>
           </p:sp>
@@ -12875,7 +12875,7 @@
         </p:nvGrpSpPr>
         <p:grpSpPr>
           <a:xfrm>
-            <a:off x="6915894" y="6862383"/>
+            <a:off x="6915894" y="5316639"/>
             <a:ext cx="590625" cy="551795"/>
             <a:chOff x="5746823" y="6863256"/>
             <a:chExt cx="590625" cy="551795"/>
@@ -12978,7 +12978,7 @@
               <a:lstStyle/>
               <a:p>
                 <a:pPr algn="ctr"/>
-                <a:endParaRPr lang="en-AU"/>
+                <a:endParaRPr lang="en-AU" sz="2000"/>
               </a:p>
             </p:txBody>
           </p:sp>
@@ -13059,7 +13059,7 @@
               <a:lstStyle/>
               <a:p>
                 <a:pPr algn="ctr"/>
-                <a:endParaRPr lang="en-AU"/>
+                <a:endParaRPr lang="en-AU" sz="2000"/>
               </a:p>
             </p:txBody>
           </p:sp>
@@ -13161,7 +13161,7 @@
               <a:lstStyle/>
               <a:p>
                 <a:pPr algn="ctr"/>
-                <a:endParaRPr lang="en-AU"/>
+                <a:endParaRPr lang="en-AU" sz="2000"/>
               </a:p>
             </p:txBody>
           </p:sp>
@@ -13242,7 +13242,7 @@
               <a:lstStyle/>
               <a:p>
                 <a:pPr algn="ctr"/>
-                <a:endParaRPr lang="en-AU"/>
+                <a:endParaRPr lang="en-AU" sz="2000"/>
               </a:p>
             </p:txBody>
           </p:sp>
@@ -13262,7 +13262,7 @@
         </p:nvGrpSpPr>
         <p:grpSpPr>
           <a:xfrm>
-            <a:off x="7502342" y="7408320"/>
+            <a:off x="7502342" y="5862576"/>
             <a:ext cx="590625" cy="551795"/>
             <a:chOff x="5746823" y="6863256"/>
             <a:chExt cx="590625" cy="551795"/>
@@ -13365,7 +13365,7 @@
               <a:lstStyle/>
               <a:p>
                 <a:pPr algn="ctr"/>
-                <a:endParaRPr lang="en-AU"/>
+                <a:endParaRPr lang="en-AU" sz="2000"/>
               </a:p>
             </p:txBody>
           </p:sp>
@@ -13446,7 +13446,7 @@
               <a:lstStyle/>
               <a:p>
                 <a:pPr algn="ctr"/>
-                <a:endParaRPr lang="en-AU"/>
+                <a:endParaRPr lang="en-AU" sz="2000"/>
               </a:p>
             </p:txBody>
           </p:sp>
@@ -13548,7 +13548,7 @@
               <a:lstStyle/>
               <a:p>
                 <a:pPr algn="ctr"/>
-                <a:endParaRPr lang="en-AU"/>
+                <a:endParaRPr lang="en-AU" sz="2000"/>
               </a:p>
             </p:txBody>
           </p:sp>
@@ -13629,7 +13629,7 @@
               <a:lstStyle/>
               <a:p>
                 <a:pPr algn="ctr"/>
-                <a:endParaRPr lang="en-AU"/>
+                <a:endParaRPr lang="en-AU" sz="2000"/>
               </a:p>
             </p:txBody>
           </p:sp>
@@ -13649,7 +13649,7 @@
         </p:nvGrpSpPr>
         <p:grpSpPr>
           <a:xfrm>
-            <a:off x="9786434" y="5779577"/>
+            <a:off x="9786434" y="4233833"/>
             <a:ext cx="590625" cy="551795"/>
             <a:chOff x="5746823" y="6863256"/>
             <a:chExt cx="590625" cy="551795"/>
@@ -13752,7 +13752,7 @@
               <a:lstStyle/>
               <a:p>
                 <a:pPr algn="ctr"/>
-                <a:endParaRPr lang="en-AU"/>
+                <a:endParaRPr lang="en-AU" sz="2000"/>
               </a:p>
             </p:txBody>
           </p:sp>
@@ -13833,7 +13833,7 @@
               <a:lstStyle/>
               <a:p>
                 <a:pPr algn="ctr"/>
-                <a:endParaRPr lang="en-AU"/>
+                <a:endParaRPr lang="en-AU" sz="2000"/>
               </a:p>
             </p:txBody>
           </p:sp>
@@ -13935,7 +13935,7 @@
               <a:lstStyle/>
               <a:p>
                 <a:pPr algn="ctr"/>
-                <a:endParaRPr lang="en-AU"/>
+                <a:endParaRPr lang="en-AU" sz="2000"/>
               </a:p>
             </p:txBody>
           </p:sp>
@@ -14016,7 +14016,7 @@
               <a:lstStyle/>
               <a:p>
                 <a:pPr algn="ctr"/>
-                <a:endParaRPr lang="en-AU"/>
+                <a:endParaRPr lang="en-AU" sz="2000"/>
               </a:p>
             </p:txBody>
           </p:sp>
@@ -14036,7 +14036,7 @@
         </p:nvGrpSpPr>
         <p:grpSpPr>
           <a:xfrm>
-            <a:off x="10369055" y="6324257"/>
+            <a:off x="10369055" y="4778513"/>
             <a:ext cx="590625" cy="551795"/>
             <a:chOff x="5746823" y="6863256"/>
             <a:chExt cx="590625" cy="551795"/>
@@ -14139,7 +14139,7 @@
               <a:lstStyle/>
               <a:p>
                 <a:pPr algn="ctr"/>
-                <a:endParaRPr lang="en-AU"/>
+                <a:endParaRPr lang="en-AU" sz="2000"/>
               </a:p>
             </p:txBody>
           </p:sp>
@@ -14220,7 +14220,7 @@
               <a:lstStyle/>
               <a:p>
                 <a:pPr algn="ctr"/>
-                <a:endParaRPr lang="en-AU"/>
+                <a:endParaRPr lang="en-AU" sz="2000"/>
               </a:p>
             </p:txBody>
           </p:sp>
@@ -14322,7 +14322,7 @@
               <a:lstStyle/>
               <a:p>
                 <a:pPr algn="ctr"/>
-                <a:endParaRPr lang="en-AU"/>
+                <a:endParaRPr lang="en-AU" sz="2000"/>
               </a:p>
             </p:txBody>
           </p:sp>
@@ -14403,7 +14403,7 @@
               <a:lstStyle/>
               <a:p>
                 <a:pPr algn="ctr"/>
-                <a:endParaRPr lang="en-AU"/>
+                <a:endParaRPr lang="en-AU" sz="2000"/>
               </a:p>
             </p:txBody>
           </p:sp>
@@ -14423,7 +14423,7 @@
         </p:nvGrpSpPr>
         <p:grpSpPr>
           <a:xfrm>
-            <a:off x="10955505" y="6875983"/>
+            <a:off x="10955505" y="5330239"/>
             <a:ext cx="590625" cy="551795"/>
             <a:chOff x="5746823" y="6863256"/>
             <a:chExt cx="590625" cy="551795"/>
@@ -14526,7 +14526,7 @@
               <a:lstStyle/>
               <a:p>
                 <a:pPr algn="ctr"/>
-                <a:endParaRPr lang="en-AU"/>
+                <a:endParaRPr lang="en-AU" sz="2000"/>
               </a:p>
             </p:txBody>
           </p:sp>
@@ -14607,7 +14607,7 @@
               <a:lstStyle/>
               <a:p>
                 <a:pPr algn="ctr"/>
-                <a:endParaRPr lang="en-AU"/>
+                <a:endParaRPr lang="en-AU" sz="2000"/>
               </a:p>
             </p:txBody>
           </p:sp>
@@ -14709,7 +14709,7 @@
               <a:lstStyle/>
               <a:p>
                 <a:pPr algn="ctr"/>
-                <a:endParaRPr lang="en-AU"/>
+                <a:endParaRPr lang="en-AU" sz="2000"/>
               </a:p>
             </p:txBody>
           </p:sp>
@@ -14790,7 +14790,7 @@
               <a:lstStyle/>
               <a:p>
                 <a:pPr algn="ctr"/>
-                <a:endParaRPr lang="en-AU"/>
+                <a:endParaRPr lang="en-AU" sz="2000"/>
               </a:p>
             </p:txBody>
           </p:sp>
@@ -14810,7 +14810,7 @@
         </p:nvGrpSpPr>
         <p:grpSpPr>
           <a:xfrm>
-            <a:off x="11541953" y="7421920"/>
+            <a:off x="11541953" y="5876176"/>
             <a:ext cx="590625" cy="551795"/>
             <a:chOff x="5746823" y="6863256"/>
             <a:chExt cx="590625" cy="551795"/>
@@ -14913,7 +14913,7 @@
               <a:lstStyle/>
               <a:p>
                 <a:pPr algn="ctr"/>
-                <a:endParaRPr lang="en-AU"/>
+                <a:endParaRPr lang="en-AU" sz="2000"/>
               </a:p>
             </p:txBody>
           </p:sp>
@@ -14994,7 +14994,7 @@
               <a:lstStyle/>
               <a:p>
                 <a:pPr algn="ctr"/>
-                <a:endParaRPr lang="en-AU"/>
+                <a:endParaRPr lang="en-AU" sz="2000"/>
               </a:p>
             </p:txBody>
           </p:sp>
@@ -15096,7 +15096,7 @@
               <a:lstStyle/>
               <a:p>
                 <a:pPr algn="ctr"/>
-                <a:endParaRPr lang="en-AU"/>
+                <a:endParaRPr lang="en-AU" sz="2000"/>
               </a:p>
             </p:txBody>
           </p:sp>
@@ -15177,7 +15177,7 @@
               <a:lstStyle/>
               <a:p>
                 <a:pPr algn="ctr"/>
-                <a:endParaRPr lang="en-AU"/>
+                <a:endParaRPr lang="en-AU" sz="2000"/>
               </a:p>
             </p:txBody>
           </p:sp>
@@ -15199,7 +15199,7 @@
         </p:nvCxnSpPr>
         <p:spPr>
           <a:xfrm>
-            <a:off x="5763756" y="4375053"/>
+            <a:off x="5763756" y="2829309"/>
             <a:ext cx="0" cy="3582330"/>
           </a:xfrm>
           <a:prstGeom prst="line">
@@ -15243,7 +15243,7 @@
         </p:nvCxnSpPr>
         <p:spPr>
           <a:xfrm>
-            <a:off x="8100692" y="4375435"/>
+            <a:off x="8100692" y="2829691"/>
             <a:ext cx="0" cy="3582330"/>
           </a:xfrm>
           <a:prstGeom prst="line">
@@ -15287,7 +15287,7 @@
         </p:nvCxnSpPr>
         <p:spPr>
           <a:xfrm>
-            <a:off x="8914273" y="4373087"/>
+            <a:off x="8914273" y="2827343"/>
             <a:ext cx="0" cy="3582330"/>
           </a:xfrm>
           <a:prstGeom prst="line">
@@ -15329,8 +15329,8 @@
         </p:nvSpPr>
         <p:spPr>
           <a:xfrm>
-            <a:off x="4662567" y="4383895"/>
-            <a:ext cx="1189749" cy="646331"/>
+            <a:off x="4322488" y="2838151"/>
+            <a:ext cx="1521571" cy="830997"/>
           </a:xfrm>
           <a:prstGeom prst="rect">
             <a:avLst/>
@@ -15344,20 +15344,20 @@
           <a:lstStyle/>
           <a:p>
             <a:r>
-              <a:rPr lang="en-AU" sz="1800" dirty="0">
+              <a:rPr lang="en-AU" sz="2400" dirty="0">
                 <a:latin typeface="+mn-lt"/>
                 <a:cs typeface="Microsoft Sans Serif" panose="020B0604020202020204" pitchFamily="34" charset="0"/>
               </a:rPr>
               <a:t>Absorbing </a:t>
             </a:r>
             <a:br>
-              <a:rPr lang="en-AU" sz="1800" dirty="0">
+              <a:rPr lang="en-AU" sz="2400" dirty="0">
                 <a:latin typeface="+mn-lt"/>
                 <a:cs typeface="Microsoft Sans Serif" panose="020B0604020202020204" pitchFamily="34" charset="0"/>
               </a:rPr>
             </a:br>
             <a:r>
-              <a:rPr lang="en-AU" sz="1800" dirty="0">
+              <a:rPr lang="en-AU" sz="2400" dirty="0">
                 <a:latin typeface="+mn-lt"/>
                 <a:cs typeface="Microsoft Sans Serif" panose="020B0604020202020204" pitchFamily="34" charset="0"/>
               </a:rPr>
@@ -15380,8 +15380,8 @@
         </p:nvSpPr>
         <p:spPr>
           <a:xfrm>
-            <a:off x="6399523" y="4380783"/>
-            <a:ext cx="976550" cy="369332"/>
+            <a:off x="6268879" y="2835039"/>
+            <a:ext cx="1237839" cy="461665"/>
           </a:xfrm>
           <a:prstGeom prst="rect">
             <a:avLst/>
@@ -15395,7 +15395,7 @@
           <a:lstStyle/>
           <a:p>
             <a:r>
-              <a:rPr lang="en-AU" sz="1800" dirty="0">
+              <a:rPr lang="en-AU" sz="2400" dirty="0">
                 <a:latin typeface="+mn-lt"/>
                 <a:cs typeface="Microsoft Sans Serif" panose="020B0604020202020204" pitchFamily="34" charset="0"/>
               </a:rPr>
@@ -15418,8 +15418,8 @@
         </p:nvSpPr>
         <p:spPr>
           <a:xfrm>
-            <a:off x="8156031" y="4390085"/>
-            <a:ext cx="784189" cy="369332"/>
+            <a:off x="8055844" y="2844341"/>
+            <a:ext cx="984565" cy="461665"/>
           </a:xfrm>
           <a:prstGeom prst="rect">
             <a:avLst/>
@@ -15433,7 +15433,7 @@
           <a:lstStyle/>
           <a:p>
             <a:r>
-              <a:rPr lang="en-AU" sz="1800" dirty="0">
+              <a:rPr lang="en-AU" sz="2400" dirty="0">
                 <a:latin typeface="+mn-lt"/>
                 <a:cs typeface="Microsoft Sans Serif" panose="020B0604020202020204" pitchFamily="34" charset="0"/>
               </a:rPr>
@@ -15456,8 +15456,8 @@
         </p:nvSpPr>
         <p:spPr>
           <a:xfrm>
-            <a:off x="11193972" y="4390085"/>
-            <a:ext cx="1683474" cy="369332"/>
+            <a:off x="7064366" y="7244169"/>
+            <a:ext cx="2787521" cy="461665"/>
           </a:xfrm>
           <a:prstGeom prst="rect">
             <a:avLst/>
@@ -15465,14 +15465,13 @@
           <a:noFill/>
         </p:spPr>
         <p:txBody>
-          <a:bodyPr wrap="none" rtlCol="0">
+          <a:bodyPr wrap="square" rtlCol="0">
             <a:spAutoFit/>
           </a:bodyPr>
           <a:lstStyle/>
           <a:p>
-            <a:pPr algn="r"/>
             <a:r>
-              <a:rPr lang="en-AU" sz="1800" dirty="0">
+              <a:rPr lang="en-AU" sz="2400" dirty="0">
                 <a:latin typeface="+mn-lt"/>
                 <a:cs typeface="Microsoft Sans Serif" panose="020B0604020202020204" pitchFamily="34" charset="0"/>
               </a:rPr>
@@ -15497,7 +15496,7 @@
         </p:nvCxnSpPr>
         <p:spPr>
           <a:xfrm flipH="1">
-            <a:off x="4702629" y="10610073"/>
+            <a:off x="4702629" y="9652149"/>
             <a:ext cx="20270" cy="2495492"/>
           </a:xfrm>
           <a:prstGeom prst="line">
@@ -15542,7 +15541,7 @@
         </p:nvCxnSpPr>
         <p:spPr>
           <a:xfrm flipH="1">
-            <a:off x="4702629" y="13097225"/>
+            <a:off x="4702629" y="12139301"/>
             <a:ext cx="7980438" cy="8340"/>
           </a:xfrm>
           <a:prstGeom prst="line">
@@ -15585,8 +15584,8 @@
         </p:nvSpPr>
         <p:spPr>
           <a:xfrm>
-            <a:off x="8119328" y="13377597"/>
-            <a:ext cx="649537" cy="369332"/>
+            <a:off x="8041583" y="12267276"/>
+            <a:ext cx="805029" cy="461665"/>
           </a:xfrm>
           <a:prstGeom prst="rect">
             <a:avLst/>
@@ -15600,7 +15599,7 @@
           <a:lstStyle/>
           <a:p>
             <a:r>
-              <a:rPr lang="en-AU" sz="1800" dirty="0">
+              <a:rPr lang="en-AU" sz="2400" dirty="0">
                 <a:latin typeface="+mn-lt"/>
                 <a:cs typeface="Microsoft Sans Serif" panose="020B0604020202020204" pitchFamily="34" charset="0"/>
               </a:rPr>
@@ -15623,8 +15622,8 @@
         </p:nvSpPr>
         <p:spPr>
           <a:xfrm rot="16200000">
-            <a:off x="3229876" y="11423106"/>
-            <a:ext cx="1510349" cy="369332"/>
+            <a:off x="3011867" y="10419016"/>
+            <a:ext cx="1946367" cy="461665"/>
           </a:xfrm>
           <a:prstGeom prst="rect">
             <a:avLst/>
@@ -15638,7 +15637,7 @@
           <a:lstStyle/>
           <a:p>
             <a:r>
-              <a:rPr lang="en-AU" sz="1800" dirty="0">
+              <a:rPr lang="en-AU" sz="2400" dirty="0">
                 <a:latin typeface="Calibri" panose="020F0502020204030204" pitchFamily="34" charset="0"/>
                 <a:cs typeface="Calibri" panose="020F0502020204030204" pitchFamily="34" charset="0"/>
               </a:rPr>
@@ -15661,7 +15660,7 @@
         </p:nvGrpSpPr>
         <p:grpSpPr>
           <a:xfrm>
-            <a:off x="4861034" y="12816076"/>
+            <a:off x="4861034" y="11858152"/>
             <a:ext cx="110362" cy="278526"/>
             <a:chOff x="4861034" y="8776136"/>
             <a:chExt cx="110362" cy="278526"/>
@@ -15744,7 +15743,7 @@
             <a:lstStyle/>
             <a:p>
               <a:pPr algn="ctr"/>
-              <a:endParaRPr lang="en-AU"/>
+              <a:endParaRPr lang="en-AU" sz="2000"/>
             </a:p>
           </p:txBody>
         </p:sp>
@@ -15825,7 +15824,7 @@
             <a:lstStyle/>
             <a:p>
               <a:pPr algn="ctr"/>
-              <a:endParaRPr lang="en-AU"/>
+              <a:endParaRPr lang="en-AU" sz="2000"/>
             </a:p>
           </p:txBody>
         </p:sp>
@@ -15844,7 +15843,7 @@
         </p:nvGrpSpPr>
         <p:grpSpPr>
           <a:xfrm>
-            <a:off x="4976649" y="12542808"/>
+            <a:off x="4976649" y="11584884"/>
             <a:ext cx="110362" cy="278526"/>
             <a:chOff x="4861034" y="8776136"/>
             <a:chExt cx="110362" cy="278526"/>
@@ -15927,7 +15926,7 @@
             <a:lstStyle/>
             <a:p>
               <a:pPr algn="ctr"/>
-              <a:endParaRPr lang="en-AU"/>
+              <a:endParaRPr lang="en-AU" sz="2000"/>
             </a:p>
           </p:txBody>
         </p:sp>
@@ -16008,7 +16007,7 @@
             <a:lstStyle/>
             <a:p>
               <a:pPr algn="ctr"/>
-              <a:endParaRPr lang="en-AU"/>
+              <a:endParaRPr lang="en-AU" sz="2000"/>
             </a:p>
           </p:txBody>
         </p:sp>
@@ -16027,7 +16026,7 @@
         </p:nvGrpSpPr>
         <p:grpSpPr>
           <a:xfrm>
-            <a:off x="5081749" y="11996275"/>
+            <a:off x="5081749" y="11038351"/>
             <a:ext cx="225977" cy="551794"/>
             <a:chOff x="4861034" y="8502868"/>
             <a:chExt cx="225977" cy="551794"/>
@@ -16130,7 +16129,7 @@
               <a:lstStyle/>
               <a:p>
                 <a:pPr algn="ctr"/>
-                <a:endParaRPr lang="en-AU"/>
+                <a:endParaRPr lang="en-AU" sz="2000"/>
               </a:p>
             </p:txBody>
           </p:sp>
@@ -16211,7 +16210,7 @@
               <a:lstStyle/>
               <a:p>
                 <a:pPr algn="ctr"/>
-                <a:endParaRPr lang="en-AU"/>
+                <a:endParaRPr lang="en-AU" sz="2000"/>
               </a:p>
             </p:txBody>
           </p:sp>
@@ -16313,7 +16312,7 @@
               <a:lstStyle/>
               <a:p>
                 <a:pPr algn="ctr"/>
-                <a:endParaRPr lang="en-AU"/>
+                <a:endParaRPr lang="en-AU" sz="2000"/>
               </a:p>
             </p:txBody>
           </p:sp>
@@ -16394,7 +16393,7 @@
               <a:lstStyle/>
               <a:p>
                 <a:pPr algn="ctr"/>
-                <a:endParaRPr lang="en-AU"/>
+                <a:endParaRPr lang="en-AU" sz="2000"/>
               </a:p>
             </p:txBody>
           </p:sp>
@@ -16414,7 +16413,7 @@
         </p:nvGrpSpPr>
         <p:grpSpPr>
           <a:xfrm>
-            <a:off x="5302464" y="11449740"/>
+            <a:off x="5302464" y="10491816"/>
             <a:ext cx="225977" cy="551794"/>
             <a:chOff x="4861034" y="8502868"/>
             <a:chExt cx="225977" cy="551794"/>
@@ -16517,7 +16516,7 @@
               <a:lstStyle/>
               <a:p>
                 <a:pPr algn="ctr"/>
-                <a:endParaRPr lang="en-AU"/>
+                <a:endParaRPr lang="en-AU" sz="2000"/>
               </a:p>
             </p:txBody>
           </p:sp>
@@ -16598,7 +16597,7 @@
               <a:lstStyle/>
               <a:p>
                 <a:pPr algn="ctr"/>
-                <a:endParaRPr lang="en-AU"/>
+                <a:endParaRPr lang="en-AU" sz="2000"/>
               </a:p>
             </p:txBody>
           </p:sp>
@@ -16700,7 +16699,7 @@
               <a:lstStyle/>
               <a:p>
                 <a:pPr algn="ctr"/>
-                <a:endParaRPr lang="en-AU"/>
+                <a:endParaRPr lang="en-AU" sz="2000"/>
               </a:p>
             </p:txBody>
           </p:sp>
@@ -16781,7 +16780,7 @@
               <a:lstStyle/>
               <a:p>
                 <a:pPr algn="ctr"/>
-                <a:endParaRPr lang="en-AU"/>
+                <a:endParaRPr lang="en-AU" sz="2000"/>
               </a:p>
             </p:txBody>
           </p:sp>
@@ -16801,7 +16800,7 @@
         </p:nvGrpSpPr>
         <p:grpSpPr>
           <a:xfrm>
-            <a:off x="5523179" y="10903205"/>
+            <a:off x="5523179" y="9945281"/>
             <a:ext cx="225977" cy="551794"/>
             <a:chOff x="4861034" y="8502868"/>
             <a:chExt cx="225977" cy="551794"/>
@@ -16904,7 +16903,7 @@
               <a:lstStyle/>
               <a:p>
                 <a:pPr algn="ctr"/>
-                <a:endParaRPr lang="en-AU"/>
+                <a:endParaRPr lang="en-AU" sz="2000"/>
               </a:p>
             </p:txBody>
           </p:sp>
@@ -16985,7 +16984,7 @@
               <a:lstStyle/>
               <a:p>
                 <a:pPr algn="ctr"/>
-                <a:endParaRPr lang="en-AU"/>
+                <a:endParaRPr lang="en-AU" sz="2000"/>
               </a:p>
             </p:txBody>
           </p:sp>
@@ -17087,7 +17086,7 @@
               <a:lstStyle/>
               <a:p>
                 <a:pPr algn="ctr"/>
-                <a:endParaRPr lang="en-AU"/>
+                <a:endParaRPr lang="en-AU" sz="2000"/>
               </a:p>
             </p:txBody>
           </p:sp>
@@ -17168,7 +17167,7 @@
               <a:lstStyle/>
               <a:p>
                 <a:pPr algn="ctr"/>
-                <a:endParaRPr lang="en-AU"/>
+                <a:endParaRPr lang="en-AU" sz="2000"/>
               </a:p>
             </p:txBody>
           </p:sp>
@@ -17188,7 +17187,7 @@
         </p:nvGrpSpPr>
         <p:grpSpPr>
           <a:xfrm>
-            <a:off x="5746823" y="10903196"/>
+            <a:off x="5746823" y="9945272"/>
             <a:ext cx="590625" cy="551795"/>
             <a:chOff x="5746823" y="6863256"/>
             <a:chExt cx="590625" cy="551795"/>
@@ -17291,7 +17290,7 @@
               <a:lstStyle/>
               <a:p>
                 <a:pPr algn="ctr"/>
-                <a:endParaRPr lang="en-AU"/>
+                <a:endParaRPr lang="en-AU" sz="2000"/>
               </a:p>
             </p:txBody>
           </p:sp>
@@ -17372,7 +17371,7 @@
               <a:lstStyle/>
               <a:p>
                 <a:pPr algn="ctr"/>
-                <a:endParaRPr lang="en-AU"/>
+                <a:endParaRPr lang="en-AU" sz="2000"/>
               </a:p>
             </p:txBody>
           </p:sp>
@@ -17474,7 +17473,7 @@
               <a:lstStyle/>
               <a:p>
                 <a:pPr algn="ctr"/>
-                <a:endParaRPr lang="en-AU"/>
+                <a:endParaRPr lang="en-AU" sz="2000"/>
               </a:p>
             </p:txBody>
           </p:sp>
@@ -17555,7 +17554,7 @@
               <a:lstStyle/>
               <a:p>
                 <a:pPr algn="ctr"/>
-                <a:endParaRPr lang="en-AU"/>
+                <a:endParaRPr lang="en-AU" sz="2000"/>
               </a:p>
             </p:txBody>
           </p:sp>
@@ -17575,7 +17574,7 @@
         </p:nvGrpSpPr>
         <p:grpSpPr>
           <a:xfrm>
-            <a:off x="8472665" y="11444378"/>
+            <a:off x="8472665" y="10486454"/>
             <a:ext cx="225977" cy="551794"/>
             <a:chOff x="4861034" y="8502868"/>
             <a:chExt cx="225977" cy="551794"/>
@@ -17678,7 +17677,7 @@
               <a:lstStyle/>
               <a:p>
                 <a:pPr algn="ctr"/>
-                <a:endParaRPr lang="en-AU"/>
+                <a:endParaRPr lang="en-AU" sz="2000"/>
               </a:p>
             </p:txBody>
           </p:sp>
@@ -17759,7 +17758,7 @@
               <a:lstStyle/>
               <a:p>
                 <a:pPr algn="ctr"/>
-                <a:endParaRPr lang="en-AU"/>
+                <a:endParaRPr lang="en-AU" sz="2000"/>
               </a:p>
             </p:txBody>
           </p:sp>
@@ -17861,7 +17860,7 @@
               <a:lstStyle/>
               <a:p>
                 <a:pPr algn="ctr"/>
-                <a:endParaRPr lang="en-AU"/>
+                <a:endParaRPr lang="en-AU" sz="2000"/>
               </a:p>
             </p:txBody>
           </p:sp>
@@ -17942,7 +17941,7 @@
               <a:lstStyle/>
               <a:p>
                 <a:pPr algn="ctr"/>
-                <a:endParaRPr lang="en-AU"/>
+                <a:endParaRPr lang="en-AU" sz="2000"/>
               </a:p>
             </p:txBody>
           </p:sp>
@@ -17962,7 +17961,7 @@
         </p:nvGrpSpPr>
         <p:grpSpPr>
           <a:xfrm>
-            <a:off x="8693380" y="10897843"/>
+            <a:off x="8693380" y="9939919"/>
             <a:ext cx="225977" cy="551794"/>
             <a:chOff x="4861034" y="8502868"/>
             <a:chExt cx="225977" cy="551794"/>
@@ -18065,7 +18064,7 @@
               <a:lstStyle/>
               <a:p>
                 <a:pPr algn="ctr"/>
-                <a:endParaRPr lang="en-AU"/>
+                <a:endParaRPr lang="en-AU" sz="2000"/>
               </a:p>
             </p:txBody>
           </p:sp>
@@ -18146,7 +18145,7 @@
               <a:lstStyle/>
               <a:p>
                 <a:pPr algn="ctr"/>
-                <a:endParaRPr lang="en-AU"/>
+                <a:endParaRPr lang="en-AU" sz="2000"/>
               </a:p>
             </p:txBody>
           </p:sp>
@@ -18248,7 +18247,7 @@
               <a:lstStyle/>
               <a:p>
                 <a:pPr algn="ctr"/>
-                <a:endParaRPr lang="en-AU"/>
+                <a:endParaRPr lang="en-AU" sz="2000"/>
               </a:p>
             </p:txBody>
           </p:sp>
@@ -18329,7 +18328,7 @@
               <a:lstStyle/>
               <a:p>
                 <a:pPr algn="ctr"/>
-                <a:endParaRPr lang="en-AU"/>
+                <a:endParaRPr lang="en-AU" sz="2000"/>
               </a:p>
             </p:txBody>
           </p:sp>
@@ -18349,7 +18348,7 @@
         </p:nvGrpSpPr>
         <p:grpSpPr>
           <a:xfrm>
-            <a:off x="6329444" y="11447876"/>
+            <a:off x="6329444" y="10489952"/>
             <a:ext cx="590625" cy="551795"/>
             <a:chOff x="5746823" y="6863256"/>
             <a:chExt cx="590625" cy="551795"/>
@@ -18452,7 +18451,7 @@
               <a:lstStyle/>
               <a:p>
                 <a:pPr algn="ctr"/>
-                <a:endParaRPr lang="en-AU"/>
+                <a:endParaRPr lang="en-AU" sz="2000"/>
               </a:p>
             </p:txBody>
           </p:sp>
@@ -18533,7 +18532,7 @@
               <a:lstStyle/>
               <a:p>
                 <a:pPr algn="ctr"/>
-                <a:endParaRPr lang="en-AU"/>
+                <a:endParaRPr lang="en-AU" sz="2000"/>
               </a:p>
             </p:txBody>
           </p:sp>
@@ -18635,7 +18634,7 @@
               <a:lstStyle/>
               <a:p>
                 <a:pPr algn="ctr"/>
-                <a:endParaRPr lang="en-AU"/>
+                <a:endParaRPr lang="en-AU" sz="2000"/>
               </a:p>
             </p:txBody>
           </p:sp>
@@ -18716,7 +18715,7 @@
               <a:lstStyle/>
               <a:p>
                 <a:pPr algn="ctr"/>
-                <a:endParaRPr lang="en-AU"/>
+                <a:endParaRPr lang="en-AU" sz="2000"/>
               </a:p>
             </p:txBody>
           </p:sp>
@@ -18736,7 +18735,7 @@
         </p:nvGrpSpPr>
         <p:grpSpPr>
           <a:xfrm>
-            <a:off x="8885099" y="10897200"/>
+            <a:off x="8885099" y="9939276"/>
             <a:ext cx="590625" cy="551795"/>
             <a:chOff x="5746823" y="6863256"/>
             <a:chExt cx="590625" cy="551795"/>
@@ -18839,7 +18838,7 @@
               <a:lstStyle/>
               <a:p>
                 <a:pPr algn="ctr"/>
-                <a:endParaRPr lang="en-AU"/>
+                <a:endParaRPr lang="en-AU" sz="2000"/>
               </a:p>
             </p:txBody>
           </p:sp>
@@ -18920,7 +18919,7 @@
               <a:lstStyle/>
               <a:p>
                 <a:pPr algn="ctr"/>
-                <a:endParaRPr lang="en-AU"/>
+                <a:endParaRPr lang="en-AU" sz="2000"/>
               </a:p>
             </p:txBody>
           </p:sp>
@@ -19022,7 +19021,7 @@
               <a:lstStyle/>
               <a:p>
                 <a:pPr algn="ctr"/>
-                <a:endParaRPr lang="en-AU"/>
+                <a:endParaRPr lang="en-AU" sz="2000"/>
               </a:p>
             </p:txBody>
           </p:sp>
@@ -19103,7 +19102,7 @@
               <a:lstStyle/>
               <a:p>
                 <a:pPr algn="ctr"/>
-                <a:endParaRPr lang="en-AU"/>
+                <a:endParaRPr lang="en-AU" sz="2000"/>
               </a:p>
             </p:txBody>
           </p:sp>
@@ -19123,7 +19122,7 @@
         </p:nvGrpSpPr>
         <p:grpSpPr>
           <a:xfrm>
-            <a:off x="9470989" y="11451678"/>
+            <a:off x="9470989" y="10493754"/>
             <a:ext cx="590625" cy="551795"/>
             <a:chOff x="5746823" y="6863256"/>
             <a:chExt cx="590625" cy="551795"/>
@@ -19226,7 +19225,7 @@
               <a:lstStyle/>
               <a:p>
                 <a:pPr algn="ctr"/>
-                <a:endParaRPr lang="en-AU"/>
+                <a:endParaRPr lang="en-AU" sz="2000"/>
               </a:p>
             </p:txBody>
           </p:sp>
@@ -19307,7 +19306,7 @@
               <a:lstStyle/>
               <a:p>
                 <a:pPr algn="ctr"/>
-                <a:endParaRPr lang="en-AU"/>
+                <a:endParaRPr lang="en-AU" sz="2000"/>
               </a:p>
             </p:txBody>
           </p:sp>
@@ -19409,7 +19408,7 @@
               <a:lstStyle/>
               <a:p>
                 <a:pPr algn="ctr"/>
-                <a:endParaRPr lang="en-AU"/>
+                <a:endParaRPr lang="en-AU" sz="2000"/>
               </a:p>
             </p:txBody>
           </p:sp>
@@ -19490,7 +19489,7 @@
               <a:lstStyle/>
               <a:p>
                 <a:pPr algn="ctr"/>
-                <a:endParaRPr lang="en-AU"/>
+                <a:endParaRPr lang="en-AU" sz="2000"/>
               </a:p>
             </p:txBody>
           </p:sp>
@@ -19512,7 +19511,7 @@
         </p:nvCxnSpPr>
         <p:spPr>
           <a:xfrm>
-            <a:off x="5763756" y="9512272"/>
+            <a:off x="5763756" y="8554348"/>
             <a:ext cx="0" cy="3582330"/>
           </a:xfrm>
           <a:prstGeom prst="line">
@@ -19556,7 +19555,7 @@
         </p:nvCxnSpPr>
         <p:spPr>
           <a:xfrm>
-            <a:off x="6932536" y="9523235"/>
+            <a:off x="6932536" y="8565311"/>
             <a:ext cx="0" cy="3582330"/>
           </a:xfrm>
           <a:prstGeom prst="line">
@@ -19598,8 +19597,8 @@
         </p:nvSpPr>
         <p:spPr>
           <a:xfrm>
-            <a:off x="4662567" y="9521114"/>
-            <a:ext cx="1189749" cy="646331"/>
+            <a:off x="4300717" y="8563190"/>
+            <a:ext cx="1521571" cy="830997"/>
           </a:xfrm>
           <a:prstGeom prst="rect">
             <a:avLst/>
@@ -19613,20 +19612,20 @@
           <a:lstStyle/>
           <a:p>
             <a:r>
-              <a:rPr lang="en-AU" sz="1800" dirty="0">
+              <a:rPr lang="en-AU" sz="2400" dirty="0">
                 <a:latin typeface="+mn-lt"/>
                 <a:cs typeface="Microsoft Sans Serif" panose="020B0604020202020204" pitchFamily="34" charset="0"/>
               </a:rPr>
               <a:t>Absorbing </a:t>
             </a:r>
             <a:br>
-              <a:rPr lang="en-AU" sz="1800" dirty="0">
+              <a:rPr lang="en-AU" sz="2400" dirty="0">
                 <a:latin typeface="+mn-lt"/>
                 <a:cs typeface="Microsoft Sans Serif" panose="020B0604020202020204" pitchFamily="34" charset="0"/>
               </a:rPr>
             </a:br>
             <a:r>
-              <a:rPr lang="en-AU" sz="1800" dirty="0">
+              <a:rPr lang="en-AU" sz="2400" dirty="0">
                 <a:latin typeface="+mn-lt"/>
                 <a:cs typeface="Microsoft Sans Serif" panose="020B0604020202020204" pitchFamily="34" charset="0"/>
               </a:rPr>
@@ -19649,8 +19648,8 @@
         </p:nvSpPr>
         <p:spPr>
           <a:xfrm>
-            <a:off x="5869032" y="9518002"/>
-            <a:ext cx="976550" cy="369332"/>
+            <a:off x="5738388" y="8560078"/>
+            <a:ext cx="1237839" cy="461665"/>
           </a:xfrm>
           <a:prstGeom prst="rect">
             <a:avLst/>
@@ -19664,7 +19663,7 @@
           <a:lstStyle/>
           <a:p>
             <a:r>
-              <a:rPr lang="en-AU" sz="1800" dirty="0">
+              <a:rPr lang="en-AU" sz="2400" dirty="0">
                 <a:latin typeface="+mn-lt"/>
                 <a:cs typeface="Microsoft Sans Serif" panose="020B0604020202020204" pitchFamily="34" charset="0"/>
               </a:rPr>
@@ -19687,8 +19686,8 @@
         </p:nvSpPr>
         <p:spPr>
           <a:xfrm>
-            <a:off x="11336640" y="9512272"/>
-            <a:ext cx="1540806" cy="369332"/>
+            <a:off x="7434892" y="13157648"/>
+            <a:ext cx="1984839" cy="461665"/>
           </a:xfrm>
           <a:prstGeom prst="rect">
             <a:avLst/>
@@ -19701,9 +19700,8 @@
           </a:bodyPr>
           <a:lstStyle/>
           <a:p>
-            <a:pPr algn="r"/>
             <a:r>
-              <a:rPr lang="en-AU" sz="1800" dirty="0">
+              <a:rPr lang="en-AU" sz="2400" dirty="0">
                 <a:latin typeface="+mn-lt"/>
                 <a:cs typeface="Microsoft Sans Serif" panose="020B0604020202020204" pitchFamily="34" charset="0"/>
               </a:rPr>
@@ -19726,7 +19724,7 @@
         </p:nvGrpSpPr>
         <p:grpSpPr>
           <a:xfrm>
-            <a:off x="6916782" y="11854851"/>
+            <a:off x="6916782" y="10896927"/>
             <a:ext cx="379604" cy="147582"/>
             <a:chOff x="6916782" y="11854851"/>
             <a:chExt cx="379604" cy="147582"/>
@@ -19835,7 +19833,7 @@
             <a:lstStyle/>
             <a:p>
               <a:pPr algn="ctr"/>
-              <a:endParaRPr lang="en-AU"/>
+              <a:endParaRPr lang="en-AU" sz="2000"/>
             </a:p>
           </p:txBody>
         </p:sp>
@@ -19942,7 +19940,7 @@
             <a:lstStyle/>
             <a:p>
               <a:pPr algn="ctr"/>
-              <a:endParaRPr lang="en-AU"/>
+              <a:endParaRPr lang="en-AU" sz="2000"/>
             </a:p>
           </p:txBody>
         </p:sp>
@@ -19961,7 +19959,7 @@
         </p:nvGrpSpPr>
         <p:grpSpPr>
           <a:xfrm>
-            <a:off x="7291250" y="11853761"/>
+            <a:off x="7291250" y="10895837"/>
             <a:ext cx="379604" cy="147582"/>
             <a:chOff x="6916782" y="11854851"/>
             <a:chExt cx="379604" cy="147582"/>
@@ -20070,7 +20068,7 @@
             <a:lstStyle/>
             <a:p>
               <a:pPr algn="ctr"/>
-              <a:endParaRPr lang="en-AU"/>
+              <a:endParaRPr lang="en-AU" sz="2000"/>
             </a:p>
           </p:txBody>
         </p:sp>
@@ -20177,7 +20175,7 @@
             <a:lstStyle/>
             <a:p>
               <a:pPr algn="ctr"/>
-              <a:endParaRPr lang="en-AU"/>
+              <a:endParaRPr lang="en-AU" sz="2000"/>
             </a:p>
           </p:txBody>
         </p:sp>
@@ -20196,7 +20194,7 @@
         </p:nvGrpSpPr>
         <p:grpSpPr>
           <a:xfrm>
-            <a:off x="7665720" y="11855937"/>
+            <a:off x="7665720" y="10898013"/>
             <a:ext cx="379604" cy="147582"/>
             <a:chOff x="6916782" y="11854851"/>
             <a:chExt cx="379604" cy="147582"/>
@@ -20305,7 +20303,7 @@
             <a:lstStyle/>
             <a:p>
               <a:pPr algn="ctr"/>
-              <a:endParaRPr lang="en-AU"/>
+              <a:endParaRPr lang="en-AU" sz="2000"/>
             </a:p>
           </p:txBody>
         </p:sp>
@@ -20412,7 +20410,7 @@
             <a:lstStyle/>
             <a:p>
               <a:pPr algn="ctr"/>
-              <a:endParaRPr lang="en-AU"/>
+              <a:endParaRPr lang="en-AU" sz="2000"/>
             </a:p>
           </p:txBody>
         </p:sp>
@@ -20431,7 +20429,7 @@
         </p:nvGrpSpPr>
         <p:grpSpPr>
           <a:xfrm>
-            <a:off x="8043456" y="11854846"/>
+            <a:off x="8043456" y="10896922"/>
             <a:ext cx="379604" cy="147582"/>
             <a:chOff x="6916782" y="11854851"/>
             <a:chExt cx="379604" cy="147582"/>
@@ -20540,7 +20538,7 @@
             <a:lstStyle/>
             <a:p>
               <a:pPr algn="ctr"/>
-              <a:endParaRPr lang="en-AU"/>
+              <a:endParaRPr lang="en-AU" sz="2000"/>
             </a:p>
           </p:txBody>
         </p:sp>
@@ -20647,7 +20645,7 @@
             <a:lstStyle/>
             <a:p>
               <a:pPr algn="ctr"/>
-              <a:endParaRPr lang="en-AU"/>
+              <a:endParaRPr lang="en-AU" sz="2000"/>
             </a:p>
           </p:txBody>
         </p:sp>
@@ -20666,7 +20664,7 @@
         </p:nvCxnSpPr>
         <p:spPr>
           <a:xfrm flipH="1">
-            <a:off x="8414658" y="11999574"/>
+            <a:off x="8414658" y="11041650"/>
             <a:ext cx="60502" cy="0"/>
           </a:xfrm>
           <a:prstGeom prst="line">
@@ -20707,7 +20705,7 @@
         </p:nvGrpSpPr>
         <p:grpSpPr>
           <a:xfrm>
-            <a:off x="11623181" y="11450273"/>
+            <a:off x="11623181" y="10492349"/>
             <a:ext cx="225977" cy="551794"/>
             <a:chOff x="4861034" y="8502868"/>
             <a:chExt cx="225977" cy="551794"/>
@@ -20810,7 +20808,7 @@
               <a:lstStyle/>
               <a:p>
                 <a:pPr algn="ctr"/>
-                <a:endParaRPr lang="en-AU"/>
+                <a:endParaRPr lang="en-AU" sz="2000"/>
               </a:p>
             </p:txBody>
           </p:sp>
@@ -20891,7 +20889,7 @@
               <a:lstStyle/>
               <a:p>
                 <a:pPr algn="ctr"/>
-                <a:endParaRPr lang="en-AU"/>
+                <a:endParaRPr lang="en-AU" sz="2000"/>
               </a:p>
             </p:txBody>
           </p:sp>
@@ -20993,7 +20991,7 @@
               <a:lstStyle/>
               <a:p>
                 <a:pPr algn="ctr"/>
-                <a:endParaRPr lang="en-AU"/>
+                <a:endParaRPr lang="en-AU" sz="2000"/>
               </a:p>
             </p:txBody>
           </p:sp>
@@ -21074,7 +21072,7 @@
               <a:lstStyle/>
               <a:p>
                 <a:pPr algn="ctr"/>
-                <a:endParaRPr lang="en-AU"/>
+                <a:endParaRPr lang="en-AU" sz="2000"/>
               </a:p>
             </p:txBody>
           </p:sp>
@@ -21094,7 +21092,7 @@
         </p:nvGrpSpPr>
         <p:grpSpPr>
           <a:xfrm>
-            <a:off x="10067298" y="11860746"/>
+            <a:off x="10067298" y="10902822"/>
             <a:ext cx="379604" cy="147582"/>
             <a:chOff x="6916782" y="11854851"/>
             <a:chExt cx="379604" cy="147582"/>
@@ -21203,7 +21201,7 @@
             <a:lstStyle/>
             <a:p>
               <a:pPr algn="ctr"/>
-              <a:endParaRPr lang="en-AU"/>
+              <a:endParaRPr lang="en-AU" sz="2000"/>
             </a:p>
           </p:txBody>
         </p:sp>
@@ -21310,7 +21308,7 @@
             <a:lstStyle/>
             <a:p>
               <a:pPr algn="ctr"/>
-              <a:endParaRPr lang="en-AU"/>
+              <a:endParaRPr lang="en-AU" sz="2000"/>
             </a:p>
           </p:txBody>
         </p:sp>
@@ -21329,7 +21327,7 @@
         </p:nvGrpSpPr>
         <p:grpSpPr>
           <a:xfrm>
-            <a:off x="10441766" y="11859656"/>
+            <a:off x="10441766" y="10901732"/>
             <a:ext cx="379604" cy="147582"/>
             <a:chOff x="6916782" y="11854851"/>
             <a:chExt cx="379604" cy="147582"/>
@@ -21438,7 +21436,7 @@
             <a:lstStyle/>
             <a:p>
               <a:pPr algn="ctr"/>
-              <a:endParaRPr lang="en-AU"/>
+              <a:endParaRPr lang="en-AU" sz="2000"/>
             </a:p>
           </p:txBody>
         </p:sp>
@@ -21545,7 +21543,7 @@
             <a:lstStyle/>
             <a:p>
               <a:pPr algn="ctr"/>
-              <a:endParaRPr lang="en-AU"/>
+              <a:endParaRPr lang="en-AU" sz="2000"/>
             </a:p>
           </p:txBody>
         </p:sp>
@@ -21564,7 +21562,7 @@
         </p:nvGrpSpPr>
         <p:grpSpPr>
           <a:xfrm>
-            <a:off x="10816236" y="11861832"/>
+            <a:off x="10816236" y="10903908"/>
             <a:ext cx="379604" cy="147582"/>
             <a:chOff x="6916782" y="11854851"/>
             <a:chExt cx="379604" cy="147582"/>
@@ -21673,7 +21671,7 @@
             <a:lstStyle/>
             <a:p>
               <a:pPr algn="ctr"/>
-              <a:endParaRPr lang="en-AU"/>
+              <a:endParaRPr lang="en-AU" sz="2000"/>
             </a:p>
           </p:txBody>
         </p:sp>
@@ -21780,7 +21778,7 @@
             <a:lstStyle/>
             <a:p>
               <a:pPr algn="ctr"/>
-              <a:endParaRPr lang="en-AU"/>
+              <a:endParaRPr lang="en-AU" sz="2000"/>
             </a:p>
           </p:txBody>
         </p:sp>
@@ -21799,7 +21797,7 @@
         </p:nvGrpSpPr>
         <p:grpSpPr>
           <a:xfrm>
-            <a:off x="11193972" y="11860741"/>
+            <a:off x="11193972" y="10902817"/>
             <a:ext cx="379604" cy="147582"/>
             <a:chOff x="6916782" y="11854851"/>
             <a:chExt cx="379604" cy="147582"/>
@@ -21908,7 +21906,7 @@
             <a:lstStyle/>
             <a:p>
               <a:pPr algn="ctr"/>
-              <a:endParaRPr lang="en-AU"/>
+              <a:endParaRPr lang="en-AU" sz="2000"/>
             </a:p>
           </p:txBody>
         </p:sp>
@@ -22015,7 +22013,7 @@
             <a:lstStyle/>
             <a:p>
               <a:pPr algn="ctr"/>
-              <a:endParaRPr lang="en-AU"/>
+              <a:endParaRPr lang="en-AU" sz="2000"/>
             </a:p>
           </p:txBody>
         </p:sp>
@@ -22034,7 +22032,7 @@
         </p:nvCxnSpPr>
         <p:spPr>
           <a:xfrm flipH="1">
-            <a:off x="11565174" y="12005469"/>
+            <a:off x="11565174" y="11047545"/>
             <a:ext cx="60502" cy="0"/>
           </a:xfrm>
           <a:prstGeom prst="line">
@@ -22075,8 +22073,8 @@
         </p:nvSpPr>
         <p:spPr>
           <a:xfrm>
-            <a:off x="6996142" y="9519148"/>
-            <a:ext cx="1239443" cy="369332"/>
+            <a:off x="7758383" y="8561224"/>
+            <a:ext cx="1587294" cy="461665"/>
           </a:xfrm>
           <a:prstGeom prst="rect">
             <a:avLst/>
@@ -22090,7 +22088,7 @@
           <a:lstStyle/>
           <a:p>
             <a:r>
-              <a:rPr lang="en-AU" sz="1800" dirty="0">
+              <a:rPr lang="en-AU" sz="2400" dirty="0">
                 <a:latin typeface="+mn-lt"/>
                 <a:cs typeface="Microsoft Sans Serif" panose="020B0604020202020204" pitchFamily="34" charset="0"/>
               </a:rPr>

</xml_diff>